<commit_message>
Add the tree view after merge
</commit_message>
<xml_diff>
--- a/Rogat-Git_intro.pptx
+++ b/Rogat-Git_intro.pptx
@@ -3614,7 +3614,7 @@
   <p:cSld>
     <p:spTree>
       <p:nvGrpSpPr>
-        <p:cNvPr id="297" name="Shape 297"/>
+        <p:cNvPr id="298" name="Shape 298"/>
         <p:cNvGrpSpPr/>
         <p:nvPr/>
       </p:nvGrpSpPr>
@@ -3628,7 +3628,7 @@
       </p:grpSpPr>
       <p:sp>
         <p:nvSpPr>
-          <p:cNvPr id="298" name="Shape 298"/>
+          <p:cNvPr id="299" name="Shape 299"/>
           <p:cNvSpPr/>
           <p:nvPr>
             <p:ph idx="2" type="sldImg"/>
@@ -3662,7 +3662,7 @@
       </p:sp>
       <p:sp>
         <p:nvSpPr>
-          <p:cNvPr id="299" name="Shape 299"/>
+          <p:cNvPr id="300" name="Shape 300"/>
           <p:cNvSpPr txBox="1"/>
           <p:nvPr>
             <p:ph idx="1" type="body"/>
@@ -3701,7 +3701,7 @@
       </p:sp>
       <p:sp>
         <p:nvSpPr>
-          <p:cNvPr id="300" name="Shape 300"/>
+          <p:cNvPr id="301" name="Shape 301"/>
           <p:cNvSpPr txBox="1"/>
           <p:nvPr>
             <p:ph idx="12" type="sldNum"/>
@@ -23176,22 +23176,22 @@
           </a:bodyPr>
           <a:lstStyle/>
           <a:p>
-            <a:pPr indent="-419100" lvl="0" marL="457200" rtl="0">
+            <a:pPr indent="-381000" lvl="0" marL="457200" rtl="0">
               <a:spcBef>
                 <a:spcPts val="640"/>
               </a:spcBef>
               <a:spcAft>
                 <a:spcPts val="0"/>
               </a:spcAft>
-              <a:buSzPts val="3000"/>
+              <a:buSzPts val="2400"/>
               <a:buAutoNum type="arabicPeriod"/>
             </a:pPr>
             <a:r>
-              <a:rPr lang="en-US" sz="3000"/>
+              <a:rPr lang="en-US" sz="2400"/>
               <a:t>clone repo </a:t>
             </a:r>
             <a:r>
-              <a:rPr i="1" lang="en-US" sz="3000" u="sng">
+              <a:rPr i="1" lang="en-US" sz="2400" u="sng">
                 <a:solidFill>
                   <a:schemeClr val="hlink"/>
                 </a:solidFill>
@@ -23199,167 +23199,201 @@
               </a:rPr>
               <a:t>https://github.com/rotshtein/gitintro.git</a:t>
             </a:r>
-            <a:endParaRPr sz="3000"/>
+            <a:endParaRPr sz="2400"/>
           </a:p>
           <a:p>
-            <a:pPr indent="-419100" lvl="0" marL="457200" rtl="0">
-              <a:spcBef>
-                <a:spcPts val="0"/>
-              </a:spcBef>
-              <a:spcAft>
-                <a:spcPts val="0"/>
-              </a:spcAft>
-              <a:buSzPts val="3000"/>
+            <a:pPr indent="-381000" lvl="0" marL="457200" rtl="0">
+              <a:spcBef>
+                <a:spcPts val="0"/>
+              </a:spcBef>
+              <a:spcAft>
+                <a:spcPts val="0"/>
+              </a:spcAft>
+              <a:buSzPts val="2400"/>
               <a:buAutoNum type="arabicPeriod"/>
             </a:pPr>
             <a:r>
-              <a:rPr lang="en-US" sz="3000"/>
+              <a:rPr lang="en-US" sz="2400"/>
               <a:t>add file to the master</a:t>
             </a:r>
-            <a:endParaRPr sz="3000"/>
+            <a:endParaRPr sz="2400"/>
           </a:p>
           <a:p>
-            <a:pPr indent="-419100" lvl="0" marL="457200" rtl="0">
-              <a:spcBef>
-                <a:spcPts val="0"/>
-              </a:spcBef>
-              <a:spcAft>
-                <a:spcPts val="0"/>
-              </a:spcAft>
-              <a:buSzPts val="3000"/>
+            <a:pPr indent="-381000" lvl="0" marL="457200" rtl="0">
+              <a:spcBef>
+                <a:spcPts val="0"/>
+              </a:spcBef>
+              <a:spcAft>
+                <a:spcPts val="0"/>
+              </a:spcAft>
+              <a:buSzPts val="2400"/>
               <a:buAutoNum type="arabicPeriod"/>
             </a:pPr>
             <a:r>
-              <a:rPr lang="en-US" sz="3000"/>
+              <a:rPr lang="en-US" sz="2400"/>
               <a:t>create branch called &lt;your name&gt;</a:t>
             </a:r>
-            <a:endParaRPr sz="3000"/>
+            <a:endParaRPr sz="2400"/>
           </a:p>
           <a:p>
-            <a:pPr indent="-419100" lvl="0" marL="457200" rtl="0">
-              <a:spcBef>
-                <a:spcPts val="0"/>
-              </a:spcBef>
-              <a:spcAft>
-                <a:spcPts val="0"/>
-              </a:spcAft>
-              <a:buSzPts val="3000"/>
+            <a:pPr indent="-381000" lvl="0" marL="457200" rtl="0">
+              <a:spcBef>
+                <a:spcPts val="0"/>
+              </a:spcBef>
+              <a:spcAft>
+                <a:spcPts val="0"/>
+              </a:spcAft>
+              <a:buSzPts val="2400"/>
               <a:buAutoNum type="arabicPeriod"/>
             </a:pPr>
             <a:r>
-              <a:rPr lang="en-US" sz="3000"/>
+              <a:rPr lang="en-US" sz="2400"/>
               <a:t>add file and commit</a:t>
             </a:r>
-            <a:endParaRPr sz="3000"/>
+            <a:endParaRPr sz="2400"/>
           </a:p>
           <a:p>
-            <a:pPr indent="-419100" lvl="0" marL="457200" rtl="0">
-              <a:spcBef>
-                <a:spcPts val="0"/>
-              </a:spcBef>
-              <a:spcAft>
-                <a:spcPts val="0"/>
-              </a:spcAft>
-              <a:buSzPts val="3000"/>
+            <a:pPr indent="-381000" lvl="0" marL="457200" rtl="0">
+              <a:spcBef>
+                <a:spcPts val="0"/>
+              </a:spcBef>
+              <a:spcAft>
+                <a:spcPts val="0"/>
+              </a:spcAft>
+              <a:buSzPts val="2400"/>
               <a:buAutoNum type="arabicPeriod"/>
             </a:pPr>
             <a:r>
-              <a:rPr lang="en-US" sz="3000"/>
+              <a:rPr lang="en-US" sz="2400"/>
               <a:t>switch to master - verify no new file</a:t>
             </a:r>
-            <a:endParaRPr sz="3000"/>
+            <a:endParaRPr sz="2400"/>
           </a:p>
           <a:p>
-            <a:pPr indent="-419100" lvl="0" marL="457200" rtl="0">
-              <a:spcBef>
-                <a:spcPts val="0"/>
-              </a:spcBef>
-              <a:spcAft>
-                <a:spcPts val="0"/>
-              </a:spcAft>
-              <a:buSzPts val="3000"/>
+            <a:pPr indent="-381000" lvl="0" marL="457200" rtl="0">
+              <a:spcBef>
+                <a:spcPts val="0"/>
+              </a:spcBef>
+              <a:spcAft>
+                <a:spcPts val="0"/>
+              </a:spcAft>
+              <a:buSzPts val="2400"/>
               <a:buAutoNum type="arabicPeriod"/>
             </a:pPr>
             <a:r>
-              <a:rPr lang="en-US" sz="3000"/>
+              <a:rPr lang="en-US" sz="2400"/>
               <a:t>Merge </a:t>
             </a:r>
             <a:r>
-              <a:rPr lang="en-US" sz="3000"/>
+              <a:rPr lang="en-US" sz="2400"/>
               <a:t>&lt;your name&gt; branch into the master</a:t>
             </a:r>
-            <a:endParaRPr sz="3000"/>
+            <a:endParaRPr sz="2400"/>
           </a:p>
           <a:p>
-            <a:pPr indent="-419100" lvl="0" marL="457200" rtl="0">
-              <a:spcBef>
-                <a:spcPts val="0"/>
-              </a:spcBef>
-              <a:spcAft>
-                <a:spcPts val="0"/>
-              </a:spcAft>
-              <a:buSzPts val="3000"/>
+            <a:pPr indent="-381000" lvl="0" marL="457200" rtl="0">
+              <a:spcBef>
+                <a:spcPts val="0"/>
+              </a:spcBef>
+              <a:spcAft>
+                <a:spcPts val="0"/>
+              </a:spcAft>
+              <a:buSzPts val="2400"/>
               <a:buAutoNum type="arabicPeriod"/>
             </a:pPr>
             <a:r>
-              <a:rPr lang="en-US" sz="3000"/>
+              <a:rPr lang="en-US" sz="2400"/>
               <a:t>commit and push (poll if needed)</a:t>
             </a:r>
-            <a:endParaRPr sz="3000"/>
+            <a:endParaRPr sz="2400"/>
           </a:p>
           <a:p>
-            <a:pPr indent="-419100" lvl="0" marL="457200" rtl="0">
-              <a:spcBef>
-                <a:spcPts val="0"/>
-              </a:spcBef>
-              <a:spcAft>
-                <a:spcPts val="0"/>
-              </a:spcAft>
-              <a:buSzPts val="3000"/>
+            <a:pPr indent="-381000" lvl="0" marL="457200" rtl="0">
+              <a:spcBef>
+                <a:spcPts val="0"/>
+              </a:spcBef>
+              <a:spcAft>
+                <a:spcPts val="0"/>
+              </a:spcAft>
+              <a:buSzPts val="2400"/>
               <a:buAutoNum type="arabicPeriod"/>
             </a:pPr>
             <a:r>
-              <a:rPr lang="en-US" sz="3000"/>
+              <a:rPr lang="en-US" sz="2400"/>
               <a:t>wait until all finish</a:t>
             </a:r>
-            <a:endParaRPr sz="3000"/>
+            <a:endParaRPr sz="2400"/>
           </a:p>
           <a:p>
-            <a:pPr indent="-419100" lvl="0" marL="457200" rtl="0">
-              <a:spcBef>
-                <a:spcPts val="0"/>
-              </a:spcBef>
-              <a:spcAft>
-                <a:spcPts val="0"/>
-              </a:spcAft>
-              <a:buSzPts val="3000"/>
+            <a:pPr indent="-381000" lvl="0" marL="457200" rtl="0">
+              <a:spcBef>
+                <a:spcPts val="0"/>
+              </a:spcBef>
+              <a:spcAft>
+                <a:spcPts val="0"/>
+              </a:spcAft>
+              <a:buSzPts val="2400"/>
               <a:buAutoNum type="arabicPeriod"/>
             </a:pPr>
             <a:r>
-              <a:rPr lang="en-US" sz="3000"/>
+              <a:rPr lang="en-US" sz="2400"/>
               <a:t>pull</a:t>
             </a:r>
-            <a:endParaRPr sz="3000"/>
+            <a:endParaRPr sz="2400"/>
           </a:p>
           <a:p>
-            <a:pPr indent="-419100" lvl="0" marL="457200">
-              <a:spcBef>
-                <a:spcPts val="0"/>
-              </a:spcBef>
-              <a:spcAft>
-                <a:spcPts val="0"/>
-              </a:spcAft>
-              <a:buSzPts val="3000"/>
+            <a:pPr indent="-381000" lvl="0" marL="457200">
+              <a:spcBef>
+                <a:spcPts val="0"/>
+              </a:spcBef>
+              <a:spcAft>
+                <a:spcPts val="0"/>
+              </a:spcAft>
+              <a:buSzPts val="2400"/>
               <a:buAutoNum type="arabicPeriod"/>
             </a:pPr>
             <a:r>
-              <a:rPr lang="en-US" sz="3000"/>
+              <a:rPr lang="en-US" sz="2400"/>
               <a:t>see log</a:t>
             </a:r>
-            <a:endParaRPr sz="3000"/>
+            <a:endParaRPr sz="2400"/>
           </a:p>
         </p:txBody>
       </p:sp>
+      <p:pic>
+        <p:nvPicPr>
+          <p:cNvPr id="297" name="Shape 297"/>
+          <p:cNvPicPr preferRelativeResize="0"/>
+          <p:nvPr/>
+        </p:nvPicPr>
+        <p:blipFill>
+          <a:blip r:embed="rId4">
+            <a:alphaModFix/>
+          </a:blip>
+          <a:stretch>
+            <a:fillRect/>
+          </a:stretch>
+        </p:blipFill>
+        <p:spPr>
+          <a:xfrm>
+            <a:off x="4387475" y="4292225"/>
+            <a:ext cx="4152900" cy="1962150"/>
+          </a:xfrm>
+          <a:prstGeom prst="rect">
+            <a:avLst/>
+          </a:prstGeom>
+          <a:noFill/>
+          <a:ln cap="flat" cmpd="sng" w="9525">
+            <a:solidFill>
+              <a:srgbClr val="000000"/>
+            </a:solidFill>
+            <a:prstDash val="solid"/>
+            <a:round/>
+            <a:headEnd len="sm" w="sm" type="none"/>
+            <a:tailEnd len="sm" w="sm" type="none"/>
+          </a:ln>
+        </p:spPr>
+      </p:pic>
     </p:spTree>
   </p:cSld>
   <p:clrMapOvr>
@@ -23373,7 +23407,7 @@
   <p:cSld>
     <p:spTree>
       <p:nvGrpSpPr>
-        <p:cNvPr id="301" name="Shape 301"/>
+        <p:cNvPr id="302" name="Shape 302"/>
         <p:cNvGrpSpPr/>
         <p:nvPr/>
       </p:nvGrpSpPr>
@@ -23387,7 +23421,7 @@
       </p:grpSpPr>
       <p:sp>
         <p:nvSpPr>
-          <p:cNvPr id="302" name="Shape 302"/>
+          <p:cNvPr id="303" name="Shape 303"/>
           <p:cNvSpPr txBox="1"/>
           <p:nvPr>
             <p:ph type="title"/>

</xml_diff>

<commit_message>
Add 2 slides from the presentation Elad sent
</commit_message>
<xml_diff>
--- a/Rogat-Git_intro.pptx
+++ b/Rogat-Git_intro.pptx
@@ -35,6 +35,9 @@
     <p:sldId id="280" r:id="rId30"/>
     <p:sldId id="281" r:id="rId31"/>
     <p:sldId id="282" r:id="rId32"/>
+    <p:sldId id="283" r:id="rId33"/>
+    <p:sldId id="284" r:id="rId34"/>
+    <p:sldId id="285" r:id="rId35"/>
   </p:sldIdLst>
   <p:sldSz cy="6858000" cx="9144000"/>
   <p:notesSz cx="6858000" cy="9144000"/>
@@ -3105,6 +3108,316 @@
       <p:sp>
         <p:nvSpPr>
           <p:cNvPr id="271" name="Shape 271"/>
+          <p:cNvSpPr/>
+          <p:nvPr>
+            <p:ph idx="2" type="sldImg"/>
+          </p:nvPr>
+        </p:nvSpPr>
+        <p:spPr>
+          <a:xfrm>
+            <a:off x="1143000" y="685800"/>
+            <a:ext cx="4572000" cy="3429000"/>
+          </a:xfrm>
+          <a:custGeom>
+            <a:pathLst>
+              <a:path extrusionOk="0" h="120000" w="120000">
+                <a:moveTo>
+                  <a:pt x="0" y="0"/>
+                </a:moveTo>
+                <a:lnTo>
+                  <a:pt x="120000" y="0"/>
+                </a:lnTo>
+                <a:lnTo>
+                  <a:pt x="120000" y="120000"/>
+                </a:lnTo>
+                <a:lnTo>
+                  <a:pt x="0" y="120000"/>
+                </a:lnTo>
+                <a:close/>
+              </a:path>
+            </a:pathLst>
+          </a:custGeom>
+        </p:spPr>
+      </p:sp>
+      <p:sp>
+        <p:nvSpPr>
+          <p:cNvPr id="272" name="Shape 272"/>
+          <p:cNvSpPr txBox="1"/>
+          <p:nvPr>
+            <p:ph idx="1" type="body"/>
+          </p:nvPr>
+        </p:nvSpPr>
+        <p:spPr>
+          <a:xfrm>
+            <a:off x="685800" y="4343400"/>
+            <a:ext cx="5486400" cy="4114800"/>
+          </a:xfrm>
+          <a:prstGeom prst="rect">
+            <a:avLst/>
+          </a:prstGeom>
+        </p:spPr>
+        <p:txBody>
+          <a:bodyPr anchorCtr="0" anchor="t" bIns="45700" lIns="91425" spcFirstLastPara="1" rIns="91425" wrap="square" tIns="45700">
+            <a:noAutofit/>
+          </a:bodyPr>
+          <a:lstStyle/>
+          <a:p>
+            <a:pPr indent="0" lvl="0" marL="0" rtl="0">
+              <a:spcBef>
+                <a:spcPts val="0"/>
+              </a:spcBef>
+              <a:spcAft>
+                <a:spcPts val="0"/>
+              </a:spcAft>
+              <a:buNone/>
+            </a:pPr>
+            <a:r>
+              <a:t/>
+            </a:r>
+            <a:endParaRPr/>
+          </a:p>
+        </p:txBody>
+      </p:sp>
+      <p:sp>
+        <p:nvSpPr>
+          <p:cNvPr id="273" name="Shape 273"/>
+          <p:cNvSpPr txBox="1"/>
+          <p:nvPr>
+            <p:ph idx="12" type="sldNum"/>
+          </p:nvPr>
+        </p:nvSpPr>
+        <p:spPr>
+          <a:xfrm>
+            <a:off x="3884613" y="8685213"/>
+            <a:ext cx="2971800" cy="457200"/>
+          </a:xfrm>
+          <a:prstGeom prst="rect">
+            <a:avLst/>
+          </a:prstGeom>
+        </p:spPr>
+        <p:txBody>
+          <a:bodyPr anchorCtr="0" anchor="b" bIns="45700" lIns="91425" spcFirstLastPara="1" rIns="91425" wrap="square" tIns="45700">
+            <a:noAutofit/>
+          </a:bodyPr>
+          <a:lstStyle/>
+          <a:p>
+            <a:pPr indent="0" lvl="0" marL="0" rtl="0">
+              <a:spcBef>
+                <a:spcPts val="0"/>
+              </a:spcBef>
+              <a:spcAft>
+                <a:spcPts val="0"/>
+              </a:spcAft>
+              <a:buNone/>
+            </a:pPr>
+            <a:fld id="{00000000-1234-1234-1234-123412341234}" type="slidenum">
+              <a:rPr lang="en-US"/>
+              <a:t>‹#›</a:t>
+            </a:fld>
+            <a:endParaRPr/>
+          </a:p>
+        </p:txBody>
+      </p:sp>
+    </p:spTree>
+  </p:cSld>
+  <p:clrMapOvr>
+    <a:masterClrMapping/>
+  </p:clrMapOvr>
+</p:notes>
+</file>
+
+<file path=ppt/notesSlides/notesSlide24.xml><?xml version="1.0" encoding="utf-8"?>
+<p:notes xmlns:a="http://schemas.openxmlformats.org/drawingml/2006/main" xmlns:r="http://schemas.openxmlformats.org/officeDocument/2006/relationships" xmlns:mc="http://schemas.openxmlformats.org/markup-compatibility/2006" xmlns:mv="urn:schemas-microsoft-com:mac:vml" xmlns:p="http://schemas.openxmlformats.org/presentationml/2006/main" xmlns:c="http://schemas.openxmlformats.org/drawingml/2006/chart" xmlns:dgm="http://schemas.openxmlformats.org/drawingml/2006/diagram" xmlns:o="urn:schemas-microsoft-com:office:office" xmlns:v="urn:schemas-microsoft-com:vml" xmlns:pvml="urn:schemas-microsoft-com:office:powerpoint" xmlns:com="http://schemas.openxmlformats.org/drawingml/2006/compatibility" xmlns:p14="http://schemas.microsoft.com/office/powerpoint/2010/main" xmlns:p15="http://schemas.microsoft.com/office/powerpoint/2012/main" showMasterPhAnim="0" showMasterSp="0">
+  <p:cSld>
+    <p:spTree>
+      <p:nvGrpSpPr>
+        <p:cNvPr id="278" name="Shape 278"/>
+        <p:cNvGrpSpPr/>
+        <p:nvPr/>
+      </p:nvGrpSpPr>
+      <p:grpSpPr>
+        <a:xfrm>
+          <a:off x="0" y="0"/>
+          <a:ext cx="0" cy="0"/>
+          <a:chOff x="0" y="0"/>
+          <a:chExt cx="0" cy="0"/>
+        </a:xfrm>
+      </p:grpSpPr>
+      <p:sp>
+        <p:nvSpPr>
+          <p:cNvPr id="279" name="Shape 279"/>
+          <p:cNvSpPr/>
+          <p:nvPr>
+            <p:ph idx="2" type="sldImg"/>
+          </p:nvPr>
+        </p:nvSpPr>
+        <p:spPr>
+          <a:xfrm>
+            <a:off x="1143000" y="685800"/>
+            <a:ext cx="4572000" cy="3429000"/>
+          </a:xfrm>
+          <a:custGeom>
+            <a:pathLst>
+              <a:path extrusionOk="0" h="120000" w="120000">
+                <a:moveTo>
+                  <a:pt x="0" y="0"/>
+                </a:moveTo>
+                <a:lnTo>
+                  <a:pt x="120000" y="0"/>
+                </a:lnTo>
+                <a:lnTo>
+                  <a:pt x="120000" y="120000"/>
+                </a:lnTo>
+                <a:lnTo>
+                  <a:pt x="0" y="120000"/>
+                </a:lnTo>
+                <a:close/>
+              </a:path>
+            </a:pathLst>
+          </a:custGeom>
+        </p:spPr>
+      </p:sp>
+      <p:sp>
+        <p:nvSpPr>
+          <p:cNvPr id="280" name="Shape 280"/>
+          <p:cNvSpPr txBox="1"/>
+          <p:nvPr>
+            <p:ph idx="1" type="body"/>
+          </p:nvPr>
+        </p:nvSpPr>
+        <p:spPr>
+          <a:xfrm>
+            <a:off x="685800" y="4343400"/>
+            <a:ext cx="5486400" cy="4114800"/>
+          </a:xfrm>
+          <a:prstGeom prst="rect">
+            <a:avLst/>
+          </a:prstGeom>
+        </p:spPr>
+        <p:txBody>
+          <a:bodyPr anchorCtr="0" anchor="t" bIns="45700" lIns="91425" spcFirstLastPara="1" rIns="91425" wrap="square" tIns="45700">
+            <a:noAutofit/>
+          </a:bodyPr>
+          <a:lstStyle/>
+          <a:p>
+            <a:pPr indent="0" lvl="0" marL="0" rtl="0">
+              <a:spcBef>
+                <a:spcPts val="0"/>
+              </a:spcBef>
+              <a:spcAft>
+                <a:spcPts val="0"/>
+              </a:spcAft>
+              <a:buNone/>
+            </a:pPr>
+            <a:r>
+              <a:t/>
+            </a:r>
+            <a:endParaRPr/>
+          </a:p>
+        </p:txBody>
+      </p:sp>
+      <p:sp>
+        <p:nvSpPr>
+          <p:cNvPr id="281" name="Shape 281"/>
+          <p:cNvSpPr txBox="1"/>
+          <p:nvPr>
+            <p:ph idx="12" type="sldNum"/>
+          </p:nvPr>
+        </p:nvSpPr>
+        <p:spPr>
+          <a:xfrm>
+            <a:off x="3884613" y="8685213"/>
+            <a:ext cx="2971800" cy="457200"/>
+          </a:xfrm>
+          <a:prstGeom prst="rect">
+            <a:avLst/>
+          </a:prstGeom>
+        </p:spPr>
+        <p:txBody>
+          <a:bodyPr anchorCtr="0" anchor="b" bIns="45700" lIns="91425" spcFirstLastPara="1" rIns="91425" wrap="square" tIns="45700">
+            <a:noAutofit/>
+          </a:bodyPr>
+          <a:lstStyle/>
+          <a:p>
+            <a:pPr indent="0" lvl="0" marL="0" rtl="0">
+              <a:spcBef>
+                <a:spcPts val="0"/>
+              </a:spcBef>
+              <a:spcAft>
+                <a:spcPts val="0"/>
+              </a:spcAft>
+              <a:buNone/>
+            </a:pPr>
+            <a:fld id="{00000000-1234-1234-1234-123412341234}" type="slidenum">
+              <a:rPr lang="en-US"/>
+              <a:t>‹#›</a:t>
+            </a:fld>
+            <a:endParaRPr/>
+          </a:p>
+        </p:txBody>
+      </p:sp>
+    </p:spTree>
+  </p:cSld>
+  <p:clrMapOvr>
+    <a:masterClrMapping/>
+  </p:clrMapOvr>
+</p:notes>
+</file>
+
+<file path=ppt/notesSlides/notesSlide25.xml><?xml version="1.0" encoding="utf-8"?>
+<p:notes xmlns:a="http://schemas.openxmlformats.org/drawingml/2006/main" xmlns:r="http://schemas.openxmlformats.org/officeDocument/2006/relationships" xmlns:mc="http://schemas.openxmlformats.org/markup-compatibility/2006" xmlns:mv="urn:schemas-microsoft-com:mac:vml" xmlns:p="http://schemas.openxmlformats.org/presentationml/2006/main" xmlns:c="http://schemas.openxmlformats.org/drawingml/2006/chart" xmlns:dgm="http://schemas.openxmlformats.org/drawingml/2006/diagram" xmlns:o="urn:schemas-microsoft-com:office:office" xmlns:v="urn:schemas-microsoft-com:vml" xmlns:pvml="urn:schemas-microsoft-com:office:powerpoint" xmlns:com="http://schemas.openxmlformats.org/drawingml/2006/compatibility" xmlns:p14="http://schemas.microsoft.com/office/powerpoint/2010/main" xmlns:p15="http://schemas.microsoft.com/office/powerpoint/2012/main" showMasterPhAnim="0" showMasterSp="0">
+  <p:cSld>
+    <p:spTree>
+      <p:nvGrpSpPr>
+        <p:cNvPr id="286" name="Shape 286"/>
+        <p:cNvGrpSpPr/>
+        <p:nvPr/>
+      </p:nvGrpSpPr>
+      <p:grpSpPr>
+        <a:xfrm>
+          <a:off x="0" y="0"/>
+          <a:ext cx="0" cy="0"/>
+          <a:chOff x="0" y="0"/>
+          <a:chExt cx="0" cy="0"/>
+        </a:xfrm>
+      </p:grpSpPr>
+      <p:sp>
+        <p:nvSpPr>
+          <p:cNvPr id="287" name="Shape 287"/>
+          <p:cNvSpPr/>
+          <p:nvPr>
+            <p:ph idx="2" type="sldImg"/>
+          </p:nvPr>
+        </p:nvSpPr>
+        <p:spPr>
+          <a:xfrm>
+            <a:off x="1143000" y="685800"/>
+            <a:ext cx="4572000" cy="3429000"/>
+          </a:xfrm>
+          <a:custGeom>
+            <a:pathLst>
+              <a:path extrusionOk="0" h="120000" w="120000">
+                <a:moveTo>
+                  <a:pt x="0" y="0"/>
+                </a:moveTo>
+                <a:lnTo>
+                  <a:pt x="120000" y="0"/>
+                </a:lnTo>
+                <a:lnTo>
+                  <a:pt x="120000" y="120000"/>
+                </a:lnTo>
+                <a:lnTo>
+                  <a:pt x="0" y="120000"/>
+                </a:lnTo>
+                <a:close/>
+              </a:path>
+            </a:pathLst>
+          </a:custGeom>
+        </p:spPr>
+      </p:sp>
+      <p:sp>
+        <p:nvSpPr>
+          <p:cNvPr id="288" name="Shape 288"/>
           <p:cNvSpPr txBox="1"/>
           <p:nvPr>
             <p:ph idx="1" type="body"/>
@@ -3143,7 +3456,115 @@
       </p:sp>
       <p:sp>
         <p:nvSpPr>
-          <p:cNvPr id="272" name="Shape 272"/>
+          <p:cNvPr id="289" name="Shape 289"/>
+          <p:cNvSpPr txBox="1"/>
+          <p:nvPr>
+            <p:ph idx="12" type="sldNum"/>
+          </p:nvPr>
+        </p:nvSpPr>
+        <p:spPr>
+          <a:xfrm>
+            <a:off x="3884613" y="8685213"/>
+            <a:ext cx="2971800" cy="457200"/>
+          </a:xfrm>
+          <a:prstGeom prst="rect">
+            <a:avLst/>
+          </a:prstGeom>
+        </p:spPr>
+        <p:txBody>
+          <a:bodyPr anchorCtr="0" anchor="b" bIns="45700" lIns="91425" spcFirstLastPara="1" rIns="91425" wrap="square" tIns="45700">
+            <a:noAutofit/>
+          </a:bodyPr>
+          <a:lstStyle/>
+          <a:p>
+            <a:pPr indent="0" lvl="0" marL="0">
+              <a:spcBef>
+                <a:spcPts val="0"/>
+              </a:spcBef>
+              <a:spcAft>
+                <a:spcPts val="0"/>
+              </a:spcAft>
+              <a:buClr>
+                <a:srgbClr val="000000"/>
+              </a:buClr>
+              <a:buFont typeface="Arial"/>
+              <a:buNone/>
+            </a:pPr>
+            <a:fld id="{00000000-1234-1234-1234-123412341234}" type="slidenum">
+              <a:rPr lang="en-US"/>
+              <a:t>‹#›</a:t>
+            </a:fld>
+            <a:endParaRPr/>
+          </a:p>
+        </p:txBody>
+      </p:sp>
+    </p:spTree>
+  </p:cSld>
+  <p:clrMapOvr>
+    <a:masterClrMapping/>
+  </p:clrMapOvr>
+</p:notes>
+</file>
+
+<file path=ppt/notesSlides/notesSlide26.xml><?xml version="1.0" encoding="utf-8"?>
+<p:notes xmlns:a="http://schemas.openxmlformats.org/drawingml/2006/main" xmlns:r="http://schemas.openxmlformats.org/officeDocument/2006/relationships" xmlns:mc="http://schemas.openxmlformats.org/markup-compatibility/2006" xmlns:mv="urn:schemas-microsoft-com:mac:vml" xmlns:p="http://schemas.openxmlformats.org/presentationml/2006/main" xmlns:c="http://schemas.openxmlformats.org/drawingml/2006/chart" xmlns:dgm="http://schemas.openxmlformats.org/drawingml/2006/diagram" xmlns:o="urn:schemas-microsoft-com:office:office" xmlns:v="urn:schemas-microsoft-com:vml" xmlns:pvml="urn:schemas-microsoft-com:office:powerpoint" xmlns:com="http://schemas.openxmlformats.org/drawingml/2006/compatibility" xmlns:p14="http://schemas.microsoft.com/office/powerpoint/2010/main" xmlns:p15="http://schemas.microsoft.com/office/powerpoint/2012/main" showMasterPhAnim="0" showMasterSp="0">
+  <p:cSld>
+    <p:spTree>
+      <p:nvGrpSpPr>
+        <p:cNvPr id="294" name="Shape 294"/>
+        <p:cNvGrpSpPr/>
+        <p:nvPr/>
+      </p:nvGrpSpPr>
+      <p:grpSpPr>
+        <a:xfrm>
+          <a:off x="0" y="0"/>
+          <a:ext cx="0" cy="0"/>
+          <a:chOff x="0" y="0"/>
+          <a:chExt cx="0" cy="0"/>
+        </a:xfrm>
+      </p:grpSpPr>
+      <p:sp>
+        <p:nvSpPr>
+          <p:cNvPr id="295" name="Shape 295"/>
+          <p:cNvSpPr txBox="1"/>
+          <p:nvPr>
+            <p:ph idx="1" type="body"/>
+          </p:nvPr>
+        </p:nvSpPr>
+        <p:spPr>
+          <a:xfrm>
+            <a:off x="685800" y="4343400"/>
+            <a:ext cx="5486400" cy="4114800"/>
+          </a:xfrm>
+          <a:prstGeom prst="rect">
+            <a:avLst/>
+          </a:prstGeom>
+        </p:spPr>
+        <p:txBody>
+          <a:bodyPr anchorCtr="0" anchor="t" bIns="45700" lIns="91425" spcFirstLastPara="1" rIns="91425" wrap="square" tIns="45700">
+            <a:noAutofit/>
+          </a:bodyPr>
+          <a:lstStyle/>
+          <a:p>
+            <a:pPr indent="0" lvl="0" marL="0">
+              <a:spcBef>
+                <a:spcPts val="0"/>
+              </a:spcBef>
+              <a:spcAft>
+                <a:spcPts val="0"/>
+              </a:spcAft>
+              <a:buNone/>
+            </a:pPr>
+            <a:r>
+              <a:t/>
+            </a:r>
+            <a:endParaRPr/>
+          </a:p>
+        </p:txBody>
+      </p:sp>
+      <p:sp>
+        <p:nvSpPr>
+          <p:cNvPr id="296" name="Shape 296"/>
           <p:cNvSpPr/>
           <p:nvPr>
             <p:ph idx="2" type="sldImg"/>
@@ -3183,12 +3604,12 @@
 </p:notes>
 </file>
 
-<file path=ppt/notesSlides/notesSlide24.xml><?xml version="1.0" encoding="utf-8"?>
+<file path=ppt/notesSlides/notesSlide27.xml><?xml version="1.0" encoding="utf-8"?>
 <p:notes xmlns:a="http://schemas.openxmlformats.org/drawingml/2006/main" xmlns:r="http://schemas.openxmlformats.org/officeDocument/2006/relationships" xmlns:mc="http://schemas.openxmlformats.org/markup-compatibility/2006" xmlns:mv="urn:schemas-microsoft-com:mac:vml" xmlns:p="http://schemas.openxmlformats.org/presentationml/2006/main" xmlns:c="http://schemas.openxmlformats.org/drawingml/2006/chart" xmlns:dgm="http://schemas.openxmlformats.org/drawingml/2006/diagram" xmlns:o="urn:schemas-microsoft-com:office:office" xmlns:v="urn:schemas-microsoft-com:vml" xmlns:pvml="urn:schemas-microsoft-com:office:powerpoint" xmlns:com="http://schemas.openxmlformats.org/drawingml/2006/compatibility" xmlns:p14="http://schemas.microsoft.com/office/powerpoint/2010/main" xmlns:p15="http://schemas.microsoft.com/office/powerpoint/2012/main" showMasterPhAnim="0" showMasterSp="0">
   <p:cSld>
     <p:spTree>
       <p:nvGrpSpPr>
-        <p:cNvPr id="276" name="Shape 276"/>
+        <p:cNvPr id="300" name="Shape 300"/>
         <p:cNvGrpSpPr/>
         <p:nvPr/>
       </p:nvGrpSpPr>
@@ -3202,7 +3623,7 @@
       </p:grpSpPr>
       <p:sp>
         <p:nvSpPr>
-          <p:cNvPr id="277" name="Shape 277"/>
+          <p:cNvPr id="301" name="Shape 301"/>
           <p:cNvSpPr/>
           <p:nvPr>
             <p:ph idx="2" type="sldImg"/>
@@ -3236,7 +3657,7 @@
       </p:sp>
       <p:sp>
         <p:nvSpPr>
-          <p:cNvPr id="278" name="Shape 278"/>
+          <p:cNvPr id="302" name="Shape 302"/>
           <p:cNvSpPr txBox="1"/>
           <p:nvPr>
             <p:ph idx="1" type="body"/>
@@ -3275,7 +3696,7 @@
       </p:sp>
       <p:sp>
         <p:nvSpPr>
-          <p:cNvPr id="279" name="Shape 279"/>
+          <p:cNvPr id="303" name="Shape 303"/>
           <p:cNvSpPr txBox="1"/>
           <p:nvPr>
             <p:ph idx="12" type="sldNum"/>
@@ -3325,12 +3746,12 @@
 </p:notes>
 </file>
 
-<file path=ppt/notesSlides/notesSlide25.xml><?xml version="1.0" encoding="utf-8"?>
+<file path=ppt/notesSlides/notesSlide28.xml><?xml version="1.0" encoding="utf-8"?>
 <p:notes xmlns:a="http://schemas.openxmlformats.org/drawingml/2006/main" xmlns:r="http://schemas.openxmlformats.org/officeDocument/2006/relationships" xmlns:mc="http://schemas.openxmlformats.org/markup-compatibility/2006" xmlns:mv="urn:schemas-microsoft-com:mac:vml" xmlns:p="http://schemas.openxmlformats.org/presentationml/2006/main" xmlns:c="http://schemas.openxmlformats.org/drawingml/2006/chart" xmlns:dgm="http://schemas.openxmlformats.org/drawingml/2006/diagram" xmlns:o="urn:schemas-microsoft-com:office:office" xmlns:v="urn:schemas-microsoft-com:vml" xmlns:pvml="urn:schemas-microsoft-com:office:powerpoint" xmlns:com="http://schemas.openxmlformats.org/drawingml/2006/compatibility" xmlns:p14="http://schemas.microsoft.com/office/powerpoint/2010/main" xmlns:p15="http://schemas.microsoft.com/office/powerpoint/2012/main" showMasterPhAnim="0" showMasterSp="0">
   <p:cSld>
     <p:spTree>
       <p:nvGrpSpPr>
-        <p:cNvPr id="283" name="Shape 283"/>
+        <p:cNvPr id="307" name="Shape 307"/>
         <p:cNvGrpSpPr/>
         <p:nvPr/>
       </p:nvGrpSpPr>
@@ -3344,7 +3765,7 @@
       </p:grpSpPr>
       <p:sp>
         <p:nvSpPr>
-          <p:cNvPr id="284" name="Shape 284"/>
+          <p:cNvPr id="308" name="Shape 308"/>
           <p:cNvSpPr/>
           <p:nvPr>
             <p:ph idx="2" type="sldImg"/>
@@ -3378,7 +3799,7 @@
       </p:sp>
       <p:sp>
         <p:nvSpPr>
-          <p:cNvPr id="285" name="Shape 285"/>
+          <p:cNvPr id="309" name="Shape 309"/>
           <p:cNvSpPr txBox="1"/>
           <p:nvPr>
             <p:ph idx="1" type="body"/>
@@ -3417,7 +3838,7 @@
       </p:sp>
       <p:sp>
         <p:nvSpPr>
-          <p:cNvPr id="286" name="Shape 286"/>
+          <p:cNvPr id="310" name="Shape 310"/>
           <p:cNvSpPr txBox="1"/>
           <p:nvPr>
             <p:ph idx="12" type="sldNum"/>
@@ -3467,12 +3888,12 @@
 </p:notes>
 </file>
 
-<file path=ppt/notesSlides/notesSlide26.xml><?xml version="1.0" encoding="utf-8"?>
+<file path=ppt/notesSlides/notesSlide29.xml><?xml version="1.0" encoding="utf-8"?>
 <p:notes xmlns:a="http://schemas.openxmlformats.org/drawingml/2006/main" xmlns:r="http://schemas.openxmlformats.org/officeDocument/2006/relationships" xmlns:mc="http://schemas.openxmlformats.org/markup-compatibility/2006" xmlns:mv="urn:schemas-microsoft-com:mac:vml" xmlns:p="http://schemas.openxmlformats.org/presentationml/2006/main" xmlns:c="http://schemas.openxmlformats.org/drawingml/2006/chart" xmlns:dgm="http://schemas.openxmlformats.org/drawingml/2006/diagram" xmlns:o="urn:schemas-microsoft-com:office:office" xmlns:v="urn:schemas-microsoft-com:vml" xmlns:pvml="urn:schemas-microsoft-com:office:powerpoint" xmlns:com="http://schemas.openxmlformats.org/drawingml/2006/compatibility" xmlns:p14="http://schemas.microsoft.com/office/powerpoint/2010/main" xmlns:p15="http://schemas.microsoft.com/office/powerpoint/2012/main" showMasterPhAnim="0" showMasterSp="0">
   <p:cSld>
     <p:spTree>
       <p:nvGrpSpPr>
-        <p:cNvPr id="290" name="Shape 290"/>
+        <p:cNvPr id="314" name="Shape 314"/>
         <p:cNvGrpSpPr/>
         <p:nvPr/>
       </p:nvGrpSpPr>
@@ -3486,7 +3907,7 @@
       </p:grpSpPr>
       <p:sp>
         <p:nvSpPr>
-          <p:cNvPr id="291" name="Shape 291"/>
+          <p:cNvPr id="315" name="Shape 315"/>
           <p:cNvSpPr/>
           <p:nvPr>
             <p:ph idx="2" type="sldImg"/>
@@ -3520,7 +3941,7 @@
       </p:sp>
       <p:sp>
         <p:nvSpPr>
-          <p:cNvPr id="292" name="Shape 292"/>
+          <p:cNvPr id="316" name="Shape 316"/>
           <p:cNvSpPr txBox="1"/>
           <p:nvPr>
             <p:ph idx="1" type="body"/>
@@ -3559,149 +3980,7 @@
       </p:sp>
       <p:sp>
         <p:nvSpPr>
-          <p:cNvPr id="293" name="Shape 293"/>
-          <p:cNvSpPr txBox="1"/>
-          <p:nvPr>
-            <p:ph idx="12" type="sldNum"/>
-          </p:nvPr>
-        </p:nvSpPr>
-        <p:spPr>
-          <a:xfrm>
-            <a:off x="3884613" y="8685213"/>
-            <a:ext cx="2971800" cy="457200"/>
-          </a:xfrm>
-          <a:prstGeom prst="rect">
-            <a:avLst/>
-          </a:prstGeom>
-        </p:spPr>
-        <p:txBody>
-          <a:bodyPr anchorCtr="0" anchor="b" bIns="45700" lIns="91425" spcFirstLastPara="1" rIns="91425" wrap="square" tIns="45700">
-            <a:noAutofit/>
-          </a:bodyPr>
-          <a:lstStyle/>
-          <a:p>
-            <a:pPr indent="0" lvl="0" marL="0">
-              <a:spcBef>
-                <a:spcPts val="0"/>
-              </a:spcBef>
-              <a:spcAft>
-                <a:spcPts val="0"/>
-              </a:spcAft>
-              <a:buClr>
-                <a:srgbClr val="000000"/>
-              </a:buClr>
-              <a:buFont typeface="Arial"/>
-              <a:buNone/>
-            </a:pPr>
-            <a:fld id="{00000000-1234-1234-1234-123412341234}" type="slidenum">
-              <a:rPr lang="en-US"/>
-              <a:t>‹#›</a:t>
-            </a:fld>
-            <a:endParaRPr/>
-          </a:p>
-        </p:txBody>
-      </p:sp>
-    </p:spTree>
-  </p:cSld>
-  <p:clrMapOvr>
-    <a:masterClrMapping/>
-  </p:clrMapOvr>
-</p:notes>
-</file>
-
-<file path=ppt/notesSlides/notesSlide27.xml><?xml version="1.0" encoding="utf-8"?>
-<p:notes xmlns:a="http://schemas.openxmlformats.org/drawingml/2006/main" xmlns:r="http://schemas.openxmlformats.org/officeDocument/2006/relationships" xmlns:mc="http://schemas.openxmlformats.org/markup-compatibility/2006" xmlns:mv="urn:schemas-microsoft-com:mac:vml" xmlns:p="http://schemas.openxmlformats.org/presentationml/2006/main" xmlns:c="http://schemas.openxmlformats.org/drawingml/2006/chart" xmlns:dgm="http://schemas.openxmlformats.org/drawingml/2006/diagram" xmlns:o="urn:schemas-microsoft-com:office:office" xmlns:v="urn:schemas-microsoft-com:vml" xmlns:pvml="urn:schemas-microsoft-com:office:powerpoint" xmlns:com="http://schemas.openxmlformats.org/drawingml/2006/compatibility" xmlns:p14="http://schemas.microsoft.com/office/powerpoint/2010/main" xmlns:p15="http://schemas.microsoft.com/office/powerpoint/2012/main" showMasterPhAnim="0" showMasterSp="0">
-  <p:cSld>
-    <p:spTree>
-      <p:nvGrpSpPr>
-        <p:cNvPr id="298" name="Shape 298"/>
-        <p:cNvGrpSpPr/>
-        <p:nvPr/>
-      </p:nvGrpSpPr>
-      <p:grpSpPr>
-        <a:xfrm>
-          <a:off x="0" y="0"/>
-          <a:ext cx="0" cy="0"/>
-          <a:chOff x="0" y="0"/>
-          <a:chExt cx="0" cy="0"/>
-        </a:xfrm>
-      </p:grpSpPr>
-      <p:sp>
-        <p:nvSpPr>
-          <p:cNvPr id="299" name="Shape 299"/>
-          <p:cNvSpPr/>
-          <p:nvPr>
-            <p:ph idx="2" type="sldImg"/>
-          </p:nvPr>
-        </p:nvSpPr>
-        <p:spPr>
-          <a:xfrm>
-            <a:off x="1143000" y="685800"/>
-            <a:ext cx="4572000" cy="3429000"/>
-          </a:xfrm>
-          <a:custGeom>
-            <a:pathLst>
-              <a:path extrusionOk="0" h="120000" w="120000">
-                <a:moveTo>
-                  <a:pt x="0" y="0"/>
-                </a:moveTo>
-                <a:lnTo>
-                  <a:pt x="120000" y="0"/>
-                </a:lnTo>
-                <a:lnTo>
-                  <a:pt x="120000" y="120000"/>
-                </a:lnTo>
-                <a:lnTo>
-                  <a:pt x="0" y="120000"/>
-                </a:lnTo>
-                <a:close/>
-              </a:path>
-            </a:pathLst>
-          </a:custGeom>
-        </p:spPr>
-      </p:sp>
-      <p:sp>
-        <p:nvSpPr>
-          <p:cNvPr id="300" name="Shape 300"/>
-          <p:cNvSpPr txBox="1"/>
-          <p:nvPr>
-            <p:ph idx="1" type="body"/>
-          </p:nvPr>
-        </p:nvSpPr>
-        <p:spPr>
-          <a:xfrm>
-            <a:off x="685800" y="4343400"/>
-            <a:ext cx="5486400" cy="4114800"/>
-          </a:xfrm>
-          <a:prstGeom prst="rect">
-            <a:avLst/>
-          </a:prstGeom>
-        </p:spPr>
-        <p:txBody>
-          <a:bodyPr anchorCtr="0" anchor="t" bIns="45700" lIns="91425" spcFirstLastPara="1" rIns="91425" wrap="square" tIns="45700">
-            <a:noAutofit/>
-          </a:bodyPr>
-          <a:lstStyle/>
-          <a:p>
-            <a:pPr indent="0" lvl="0" marL="0">
-              <a:spcBef>
-                <a:spcPts val="0"/>
-              </a:spcBef>
-              <a:spcAft>
-                <a:spcPts val="0"/>
-              </a:spcAft>
-              <a:buNone/>
-            </a:pPr>
-            <a:r>
-              <a:t/>
-            </a:r>
-            <a:endParaRPr/>
-          </a:p>
-        </p:txBody>
-      </p:sp>
-      <p:sp>
-        <p:nvSpPr>
-          <p:cNvPr id="301" name="Shape 301"/>
+          <p:cNvPr id="317" name="Shape 317"/>
           <p:cNvSpPr txBox="1"/>
           <p:nvPr>
             <p:ph idx="12" type="sldNum"/>
@@ -3840,6 +4119,148 @@
             </a:pathLst>
           </a:custGeom>
         </p:spPr>
+      </p:sp>
+    </p:spTree>
+  </p:cSld>
+  <p:clrMapOvr>
+    <a:masterClrMapping/>
+  </p:clrMapOvr>
+</p:notes>
+</file>
+
+<file path=ppt/notesSlides/notesSlide30.xml><?xml version="1.0" encoding="utf-8"?>
+<p:notes xmlns:a="http://schemas.openxmlformats.org/drawingml/2006/main" xmlns:r="http://schemas.openxmlformats.org/officeDocument/2006/relationships" xmlns:mc="http://schemas.openxmlformats.org/markup-compatibility/2006" xmlns:mv="urn:schemas-microsoft-com:mac:vml" xmlns:p="http://schemas.openxmlformats.org/presentationml/2006/main" xmlns:c="http://schemas.openxmlformats.org/drawingml/2006/chart" xmlns:dgm="http://schemas.openxmlformats.org/drawingml/2006/diagram" xmlns:o="urn:schemas-microsoft-com:office:office" xmlns:v="urn:schemas-microsoft-com:vml" xmlns:pvml="urn:schemas-microsoft-com:office:powerpoint" xmlns:com="http://schemas.openxmlformats.org/drawingml/2006/compatibility" xmlns:p14="http://schemas.microsoft.com/office/powerpoint/2010/main" xmlns:p15="http://schemas.microsoft.com/office/powerpoint/2012/main" showMasterPhAnim="0" showMasterSp="0">
+  <p:cSld>
+    <p:spTree>
+      <p:nvGrpSpPr>
+        <p:cNvPr id="322" name="Shape 322"/>
+        <p:cNvGrpSpPr/>
+        <p:nvPr/>
+      </p:nvGrpSpPr>
+      <p:grpSpPr>
+        <a:xfrm>
+          <a:off x="0" y="0"/>
+          <a:ext cx="0" cy="0"/>
+          <a:chOff x="0" y="0"/>
+          <a:chExt cx="0" cy="0"/>
+        </a:xfrm>
+      </p:grpSpPr>
+      <p:sp>
+        <p:nvSpPr>
+          <p:cNvPr id="323" name="Shape 323"/>
+          <p:cNvSpPr/>
+          <p:nvPr>
+            <p:ph idx="2" type="sldImg"/>
+          </p:nvPr>
+        </p:nvSpPr>
+        <p:spPr>
+          <a:xfrm>
+            <a:off x="1143000" y="685800"/>
+            <a:ext cx="4572000" cy="3429000"/>
+          </a:xfrm>
+          <a:custGeom>
+            <a:pathLst>
+              <a:path extrusionOk="0" h="120000" w="120000">
+                <a:moveTo>
+                  <a:pt x="0" y="0"/>
+                </a:moveTo>
+                <a:lnTo>
+                  <a:pt x="120000" y="0"/>
+                </a:lnTo>
+                <a:lnTo>
+                  <a:pt x="120000" y="120000"/>
+                </a:lnTo>
+                <a:lnTo>
+                  <a:pt x="0" y="120000"/>
+                </a:lnTo>
+                <a:close/>
+              </a:path>
+            </a:pathLst>
+          </a:custGeom>
+        </p:spPr>
+      </p:sp>
+      <p:sp>
+        <p:nvSpPr>
+          <p:cNvPr id="324" name="Shape 324"/>
+          <p:cNvSpPr txBox="1"/>
+          <p:nvPr>
+            <p:ph idx="1" type="body"/>
+          </p:nvPr>
+        </p:nvSpPr>
+        <p:spPr>
+          <a:xfrm>
+            <a:off x="685800" y="4343400"/>
+            <a:ext cx="5486400" cy="4114800"/>
+          </a:xfrm>
+          <a:prstGeom prst="rect">
+            <a:avLst/>
+          </a:prstGeom>
+        </p:spPr>
+        <p:txBody>
+          <a:bodyPr anchorCtr="0" anchor="t" bIns="45700" lIns="91425" spcFirstLastPara="1" rIns="91425" wrap="square" tIns="45700">
+            <a:noAutofit/>
+          </a:bodyPr>
+          <a:lstStyle/>
+          <a:p>
+            <a:pPr indent="0" lvl="0" marL="0">
+              <a:spcBef>
+                <a:spcPts val="0"/>
+              </a:spcBef>
+              <a:spcAft>
+                <a:spcPts val="0"/>
+              </a:spcAft>
+              <a:buNone/>
+            </a:pPr>
+            <a:r>
+              <a:t/>
+            </a:r>
+            <a:endParaRPr/>
+          </a:p>
+        </p:txBody>
+      </p:sp>
+      <p:sp>
+        <p:nvSpPr>
+          <p:cNvPr id="325" name="Shape 325"/>
+          <p:cNvSpPr txBox="1"/>
+          <p:nvPr>
+            <p:ph idx="12" type="sldNum"/>
+          </p:nvPr>
+        </p:nvSpPr>
+        <p:spPr>
+          <a:xfrm>
+            <a:off x="3884613" y="8685213"/>
+            <a:ext cx="2971800" cy="457200"/>
+          </a:xfrm>
+          <a:prstGeom prst="rect">
+            <a:avLst/>
+          </a:prstGeom>
+        </p:spPr>
+        <p:txBody>
+          <a:bodyPr anchorCtr="0" anchor="b" bIns="45700" lIns="91425" spcFirstLastPara="1" rIns="91425" wrap="square" tIns="45700">
+            <a:noAutofit/>
+          </a:bodyPr>
+          <a:lstStyle/>
+          <a:p>
+            <a:pPr indent="0" lvl="0" marL="0">
+              <a:spcBef>
+                <a:spcPts val="0"/>
+              </a:spcBef>
+              <a:spcAft>
+                <a:spcPts val="0"/>
+              </a:spcAft>
+              <a:buClr>
+                <a:srgbClr val="000000"/>
+              </a:buClr>
+              <a:buFont typeface="Arial"/>
+              <a:buNone/>
+            </a:pPr>
+            <a:fld id="{00000000-1234-1234-1234-123412341234}" type="slidenum">
+              <a:rPr lang="en-US"/>
+              <a:t>‹#›</a:t>
+            </a:fld>
+            <a:endParaRPr/>
+          </a:p>
+        </p:txBody>
       </p:sp>
     </p:spTree>
   </p:cSld>
@@ -22209,7 +22630,268 @@
   <p:cSld>
     <p:spTree>
       <p:nvGrpSpPr>
-        <p:cNvPr id="273" name="Shape 273"/>
+        <p:cNvPr id="274" name="Shape 274"/>
+        <p:cNvGrpSpPr/>
+        <p:nvPr/>
+      </p:nvGrpSpPr>
+      <p:grpSpPr>
+        <a:xfrm>
+          <a:off x="0" y="0"/>
+          <a:ext cx="0" cy="0"/>
+          <a:chOff x="0" y="0"/>
+          <a:chExt cx="0" cy="0"/>
+        </a:xfrm>
+      </p:grpSpPr>
+      <p:pic>
+        <p:nvPicPr>
+          <p:cNvPr id="275" name="Shape 275"/>
+          <p:cNvPicPr preferRelativeResize="0"/>
+          <p:nvPr/>
+        </p:nvPicPr>
+        <p:blipFill>
+          <a:blip r:embed="rId3">
+            <a:alphaModFix/>
+          </a:blip>
+          <a:stretch>
+            <a:fillRect/>
+          </a:stretch>
+        </p:blipFill>
+        <p:spPr>
+          <a:xfrm>
+            <a:off x="5486400" y="1365875"/>
+            <a:ext cx="3657600" cy="4953000"/>
+          </a:xfrm>
+          <a:prstGeom prst="rect">
+            <a:avLst/>
+          </a:prstGeom>
+          <a:noFill/>
+          <a:ln>
+            <a:noFill/>
+          </a:ln>
+        </p:spPr>
+      </p:pic>
+      <p:sp>
+        <p:nvSpPr>
+          <p:cNvPr id="276" name="Shape 276"/>
+          <p:cNvSpPr txBox="1"/>
+          <p:nvPr/>
+        </p:nvSpPr>
+        <p:spPr>
+          <a:xfrm>
+            <a:off x="0" y="0"/>
+            <a:ext cx="9144000" cy="708000"/>
+          </a:xfrm>
+          <a:prstGeom prst="rect">
+            <a:avLst/>
+          </a:prstGeom>
+          <a:noFill/>
+          <a:ln>
+            <a:noFill/>
+          </a:ln>
+        </p:spPr>
+        <p:txBody>
+          <a:bodyPr anchorCtr="0" anchor="t" bIns="45700" lIns="91425" spcFirstLastPara="1" rIns="91425" wrap="square" tIns="45700">
+            <a:noAutofit/>
+          </a:bodyPr>
+          <a:lstStyle/>
+          <a:p>
+            <a:pPr indent="0" lvl="0" marL="0" marR="0" rtl="0" algn="l">
+              <a:spcBef>
+                <a:spcPts val="0"/>
+              </a:spcBef>
+              <a:spcAft>
+                <a:spcPts val="0"/>
+              </a:spcAft>
+              <a:buNone/>
+            </a:pPr>
+            <a:r>
+              <a:rPr lang="en-US" sz="4000" u="sng">
+                <a:solidFill>
+                  <a:schemeClr val="dk2"/>
+                </a:solidFill>
+              </a:rPr>
+              <a:t>Feature branches (topic branches)</a:t>
+            </a:r>
+            <a:endParaRPr sz="4000" u="sng">
+              <a:solidFill>
+                <a:schemeClr val="dk2"/>
+              </a:solidFill>
+            </a:endParaRPr>
+          </a:p>
+          <a:p>
+            <a:pPr indent="0" lvl="0" marL="0" marR="0" rtl="0" algn="l">
+              <a:spcBef>
+                <a:spcPts val="0"/>
+              </a:spcBef>
+              <a:spcAft>
+                <a:spcPts val="0"/>
+              </a:spcAft>
+              <a:buNone/>
+            </a:pPr>
+            <a:r>
+              <a:t/>
+            </a:r>
+            <a:endParaRPr sz="4000" u="sng">
+              <a:solidFill>
+                <a:schemeClr val="dk2"/>
+              </a:solidFill>
+            </a:endParaRPr>
+          </a:p>
+        </p:txBody>
+      </p:sp>
+      <p:sp>
+        <p:nvSpPr>
+          <p:cNvPr id="277" name="Shape 277"/>
+          <p:cNvSpPr txBox="1"/>
+          <p:nvPr/>
+        </p:nvSpPr>
+        <p:spPr>
+          <a:xfrm>
+            <a:off x="0" y="1365875"/>
+            <a:ext cx="7459800" cy="5358300"/>
+          </a:xfrm>
+          <a:prstGeom prst="rect">
+            <a:avLst/>
+          </a:prstGeom>
+          <a:noFill/>
+          <a:ln>
+            <a:noFill/>
+          </a:ln>
+        </p:spPr>
+        <p:txBody>
+          <a:bodyPr anchorCtr="0" anchor="t" bIns="91425" lIns="91425" spcFirstLastPara="1" rIns="91425" wrap="square" tIns="91425">
+            <a:noAutofit/>
+          </a:bodyPr>
+          <a:lstStyle/>
+          <a:p>
+            <a:pPr indent="-419100" lvl="0" marL="457200" rtl="0">
+              <a:spcBef>
+                <a:spcPts val="0"/>
+              </a:spcBef>
+              <a:spcAft>
+                <a:spcPts val="0"/>
+              </a:spcAft>
+              <a:buSzPts val="3000"/>
+              <a:buChar char="●"/>
+            </a:pPr>
+            <a:r>
+              <a:rPr lang="en-US" sz="3000"/>
+              <a:t>May branch off from:</a:t>
+            </a:r>
+            <a:endParaRPr sz="3000"/>
+          </a:p>
+          <a:p>
+            <a:pPr indent="457200" lvl="0" marL="0" rtl="0">
+              <a:spcBef>
+                <a:spcPts val="0"/>
+              </a:spcBef>
+              <a:spcAft>
+                <a:spcPts val="0"/>
+              </a:spcAft>
+              <a:buNone/>
+            </a:pPr>
+            <a:r>
+              <a:rPr lang="en-US" sz="3000"/>
+              <a:t>○ develop</a:t>
+            </a:r>
+            <a:endParaRPr sz="3000"/>
+          </a:p>
+          <a:p>
+            <a:pPr indent="0" lvl="0" marL="0" rtl="0">
+              <a:spcBef>
+                <a:spcPts val="0"/>
+              </a:spcBef>
+              <a:spcAft>
+                <a:spcPts val="0"/>
+              </a:spcAft>
+              <a:buNone/>
+            </a:pPr>
+            <a:r>
+              <a:rPr lang="en-US" sz="3000"/>
+              <a:t>● May merge back into:</a:t>
+            </a:r>
+            <a:endParaRPr sz="3000"/>
+          </a:p>
+          <a:p>
+            <a:pPr indent="457200" lvl="0" marL="0" rtl="0">
+              <a:spcBef>
+                <a:spcPts val="0"/>
+              </a:spcBef>
+              <a:spcAft>
+                <a:spcPts val="0"/>
+              </a:spcAft>
+              <a:buNone/>
+            </a:pPr>
+            <a:r>
+              <a:rPr lang="en-US" sz="3000"/>
+              <a:t>○ develop</a:t>
+            </a:r>
+            <a:endParaRPr sz="3000"/>
+          </a:p>
+          <a:p>
+            <a:pPr indent="0" lvl="0" marL="0" rtl="0">
+              <a:spcBef>
+                <a:spcPts val="0"/>
+              </a:spcBef>
+              <a:spcAft>
+                <a:spcPts val="0"/>
+              </a:spcAft>
+              <a:buNone/>
+            </a:pPr>
+            <a:r>
+              <a:rPr lang="en-US" sz="3000"/>
+              <a:t>● Branching name convention:</a:t>
+            </a:r>
+            <a:endParaRPr sz="3000"/>
+          </a:p>
+          <a:p>
+            <a:pPr indent="457200" lvl="0" marL="0" rtl="0">
+              <a:spcBef>
+                <a:spcPts val="0"/>
+              </a:spcBef>
+              <a:spcAft>
+                <a:spcPts val="0"/>
+              </a:spcAft>
+              <a:buNone/>
+            </a:pPr>
+            <a:r>
+              <a:rPr lang="en-US" sz="3000"/>
+              <a:t>○ anything except master, </a:t>
+            </a:r>
+            <a:endParaRPr sz="3000"/>
+          </a:p>
+          <a:p>
+            <a:pPr indent="457200" lvl="0" marL="457200" rtl="0">
+              <a:spcBef>
+                <a:spcPts val="0"/>
+              </a:spcBef>
+              <a:spcAft>
+                <a:spcPts val="0"/>
+              </a:spcAft>
+              <a:buNone/>
+            </a:pPr>
+            <a:r>
+              <a:rPr lang="en-US" sz="3000"/>
+              <a:t>develop,release-* or hotfix-*</a:t>
+            </a:r>
+            <a:endParaRPr sz="3000"/>
+          </a:p>
+        </p:txBody>
+      </p:sp>
+    </p:spTree>
+  </p:cSld>
+  <p:clrMapOvr>
+    <a:masterClrMapping/>
+  </p:clrMapOvr>
+</p:sld>
+</file>
+
+<file path=ppt/slides/slide24.xml><?xml version="1.0" encoding="utf-8"?>
+<p:sld xmlns:a="http://schemas.openxmlformats.org/drawingml/2006/main" xmlns:r="http://schemas.openxmlformats.org/officeDocument/2006/relationships" xmlns:mc="http://schemas.openxmlformats.org/markup-compatibility/2006" xmlns:mv="urn:schemas-microsoft-com:mac:vml" xmlns:p="http://schemas.openxmlformats.org/presentationml/2006/main" xmlns:c="http://schemas.openxmlformats.org/drawingml/2006/chart" xmlns:dgm="http://schemas.openxmlformats.org/drawingml/2006/diagram" xmlns:o="urn:schemas-microsoft-com:office:office" xmlns:v="urn:schemas-microsoft-com:vml" xmlns:pvml="urn:schemas-microsoft-com:office:powerpoint" xmlns:com="http://schemas.openxmlformats.org/drawingml/2006/compatibility" xmlns:p14="http://schemas.microsoft.com/office/powerpoint/2010/main" xmlns:p15="http://schemas.microsoft.com/office/powerpoint/2012/main">
+  <p:cSld>
+    <p:spTree>
+      <p:nvGrpSpPr>
+        <p:cNvPr id="282" name="Shape 282"/>
         <p:cNvGrpSpPr/>
         <p:nvPr/>
       </p:nvGrpSpPr>
@@ -22223,7 +22905,681 @@
       </p:grpSpPr>
       <p:sp>
         <p:nvSpPr>
-          <p:cNvPr id="274" name="Shape 274"/>
+          <p:cNvPr id="283" name="Shape 283"/>
+          <p:cNvSpPr txBox="1"/>
+          <p:nvPr/>
+        </p:nvSpPr>
+        <p:spPr>
+          <a:xfrm>
+            <a:off x="0" y="0"/>
+            <a:ext cx="9144000" cy="708000"/>
+          </a:xfrm>
+          <a:prstGeom prst="rect">
+            <a:avLst/>
+          </a:prstGeom>
+          <a:noFill/>
+          <a:ln>
+            <a:noFill/>
+          </a:ln>
+        </p:spPr>
+        <p:txBody>
+          <a:bodyPr anchorCtr="0" anchor="t" bIns="45700" lIns="91425" spcFirstLastPara="1" rIns="91425" wrap="square" tIns="45700">
+            <a:noAutofit/>
+          </a:bodyPr>
+          <a:lstStyle/>
+          <a:p>
+            <a:pPr indent="0" lvl="0" marL="0" marR="0" rtl="0" algn="l">
+              <a:spcBef>
+                <a:spcPts val="0"/>
+              </a:spcBef>
+              <a:spcAft>
+                <a:spcPts val="0"/>
+              </a:spcAft>
+              <a:buNone/>
+            </a:pPr>
+            <a:r>
+              <a:rPr lang="en-US" sz="4000" u="sng">
+                <a:solidFill>
+                  <a:schemeClr val="dk2"/>
+                </a:solidFill>
+              </a:rPr>
+              <a:t>The main branches</a:t>
+            </a:r>
+            <a:endParaRPr sz="4000" u="sng">
+              <a:solidFill>
+                <a:schemeClr val="dk2"/>
+              </a:solidFill>
+            </a:endParaRPr>
+          </a:p>
+          <a:p>
+            <a:pPr indent="0" lvl="0" marL="0" marR="0" rtl="0" algn="l">
+              <a:spcBef>
+                <a:spcPts val="0"/>
+              </a:spcBef>
+              <a:spcAft>
+                <a:spcPts val="0"/>
+              </a:spcAft>
+              <a:buNone/>
+            </a:pPr>
+            <a:r>
+              <a:t/>
+            </a:r>
+            <a:endParaRPr sz="4000" u="sng">
+              <a:solidFill>
+                <a:schemeClr val="dk2"/>
+              </a:solidFill>
+            </a:endParaRPr>
+          </a:p>
+          <a:p>
+            <a:pPr indent="0" lvl="0" marL="0" marR="0" rtl="0" algn="l">
+              <a:spcBef>
+                <a:spcPts val="0"/>
+              </a:spcBef>
+              <a:spcAft>
+                <a:spcPts val="0"/>
+              </a:spcAft>
+              <a:buNone/>
+            </a:pPr>
+            <a:r>
+              <a:t/>
+            </a:r>
+            <a:endParaRPr sz="4000" u="sng">
+              <a:solidFill>
+                <a:schemeClr val="dk2"/>
+              </a:solidFill>
+            </a:endParaRPr>
+          </a:p>
+        </p:txBody>
+      </p:sp>
+      <p:pic>
+        <p:nvPicPr>
+          <p:cNvPr id="284" name="Shape 284"/>
+          <p:cNvPicPr preferRelativeResize="0"/>
+          <p:nvPr/>
+        </p:nvPicPr>
+        <p:blipFill>
+          <a:blip r:embed="rId3">
+            <a:alphaModFix/>
+          </a:blip>
+          <a:stretch>
+            <a:fillRect/>
+          </a:stretch>
+        </p:blipFill>
+        <p:spPr>
+          <a:xfrm>
+            <a:off x="6246888" y="1285875"/>
+            <a:ext cx="2809875" cy="4286250"/>
+          </a:xfrm>
+          <a:prstGeom prst="rect">
+            <a:avLst/>
+          </a:prstGeom>
+          <a:noFill/>
+          <a:ln>
+            <a:noFill/>
+          </a:ln>
+        </p:spPr>
+      </p:pic>
+      <p:sp>
+        <p:nvSpPr>
+          <p:cNvPr id="285" name="Shape 285"/>
+          <p:cNvSpPr txBox="1"/>
+          <p:nvPr/>
+        </p:nvSpPr>
+        <p:spPr>
+          <a:xfrm>
+            <a:off x="0" y="1365875"/>
+            <a:ext cx="7459800" cy="5358300"/>
+          </a:xfrm>
+          <a:prstGeom prst="rect">
+            <a:avLst/>
+          </a:prstGeom>
+          <a:noFill/>
+          <a:ln>
+            <a:noFill/>
+          </a:ln>
+        </p:spPr>
+        <p:txBody>
+          <a:bodyPr anchorCtr="0" anchor="t" bIns="91425" lIns="91425" spcFirstLastPara="1" rIns="91425" wrap="square" tIns="91425">
+            <a:noAutofit/>
+          </a:bodyPr>
+          <a:lstStyle/>
+          <a:p>
+            <a:pPr indent="-431800" lvl="0" marL="457200" rtl="0">
+              <a:spcBef>
+                <a:spcPts val="0"/>
+              </a:spcBef>
+              <a:spcAft>
+                <a:spcPts val="0"/>
+              </a:spcAft>
+              <a:buClr>
+                <a:schemeClr val="dk1"/>
+              </a:buClr>
+              <a:buSzPts val="3200"/>
+              <a:buChar char="●"/>
+            </a:pPr>
+            <a:r>
+              <a:rPr lang="en-US" sz="3200">
+                <a:solidFill>
+                  <a:schemeClr val="dk1"/>
+                </a:solidFill>
+              </a:rPr>
+              <a:t>master</a:t>
+            </a:r>
+            <a:endParaRPr sz="3200">
+              <a:solidFill>
+                <a:schemeClr val="dk1"/>
+              </a:solidFill>
+            </a:endParaRPr>
+          </a:p>
+          <a:p>
+            <a:pPr indent="457200" lvl="0" marL="457200" rtl="0">
+              <a:spcBef>
+                <a:spcPts val="0"/>
+              </a:spcBef>
+              <a:spcAft>
+                <a:spcPts val="0"/>
+              </a:spcAft>
+              <a:buClr>
+                <a:srgbClr val="000000"/>
+              </a:buClr>
+              <a:buSzPts val="1100"/>
+              <a:buFont typeface="Arial"/>
+              <a:buNone/>
+            </a:pPr>
+            <a:r>
+              <a:rPr lang="en-US" sz="3200">
+                <a:solidFill>
+                  <a:schemeClr val="dk1"/>
+                </a:solidFill>
+              </a:rPr>
+              <a:t>○ contains production ready code</a:t>
+            </a:r>
+            <a:endParaRPr sz="3200">
+              <a:solidFill>
+                <a:schemeClr val="dk1"/>
+              </a:solidFill>
+            </a:endParaRPr>
+          </a:p>
+          <a:p>
+            <a:pPr indent="-431800" lvl="0" marL="457200" rtl="0">
+              <a:spcBef>
+                <a:spcPts val="0"/>
+              </a:spcBef>
+              <a:spcAft>
+                <a:spcPts val="0"/>
+              </a:spcAft>
+              <a:buClr>
+                <a:schemeClr val="dk1"/>
+              </a:buClr>
+              <a:buSzPts val="3200"/>
+              <a:buChar char="●"/>
+            </a:pPr>
+            <a:r>
+              <a:rPr lang="en-US" sz="3200">
+                <a:solidFill>
+                  <a:schemeClr val="dk1"/>
+                </a:solidFill>
+              </a:rPr>
+              <a:t>develop</a:t>
+            </a:r>
+            <a:endParaRPr sz="3200">
+              <a:solidFill>
+                <a:schemeClr val="dk1"/>
+              </a:solidFill>
+            </a:endParaRPr>
+          </a:p>
+          <a:p>
+            <a:pPr indent="457200" lvl="0" marL="457200" rtl="0">
+              <a:spcBef>
+                <a:spcPts val="0"/>
+              </a:spcBef>
+              <a:spcAft>
+                <a:spcPts val="0"/>
+              </a:spcAft>
+              <a:buClr>
+                <a:srgbClr val="000000"/>
+              </a:buClr>
+              <a:buSzPts val="1100"/>
+              <a:buFont typeface="Arial"/>
+              <a:buNone/>
+            </a:pPr>
+            <a:r>
+              <a:rPr lang="en-US" sz="3200">
+                <a:solidFill>
+                  <a:schemeClr val="dk1"/>
+                </a:solidFill>
+              </a:rPr>
+              <a:t>○ an integration branch</a:t>
+            </a:r>
+            <a:endParaRPr sz="3200">
+              <a:solidFill>
+                <a:schemeClr val="dk1"/>
+              </a:solidFill>
+            </a:endParaRPr>
+          </a:p>
+          <a:p>
+            <a:pPr indent="457200" lvl="0" marL="457200" rtl="0">
+              <a:spcBef>
+                <a:spcPts val="0"/>
+              </a:spcBef>
+              <a:spcAft>
+                <a:spcPts val="0"/>
+              </a:spcAft>
+              <a:buClr>
+                <a:srgbClr val="000000"/>
+              </a:buClr>
+              <a:buSzPts val="1100"/>
+              <a:buFont typeface="Arial"/>
+              <a:buNone/>
+            </a:pPr>
+            <a:r>
+              <a:rPr lang="en-US" sz="3200">
+                <a:solidFill>
+                  <a:schemeClr val="dk1"/>
+                </a:solidFill>
+              </a:rPr>
+              <a:t>○ contains the latest changes</a:t>
+            </a:r>
+            <a:endParaRPr sz="3200">
+              <a:solidFill>
+                <a:schemeClr val="dk1"/>
+              </a:solidFill>
+            </a:endParaRPr>
+          </a:p>
+          <a:p>
+            <a:pPr indent="457200" lvl="0" marL="457200" rtl="0">
+              <a:spcBef>
+                <a:spcPts val="0"/>
+              </a:spcBef>
+              <a:spcAft>
+                <a:spcPts val="0"/>
+              </a:spcAft>
+              <a:buClr>
+                <a:srgbClr val="000000"/>
+              </a:buClr>
+              <a:buSzPts val="1100"/>
+              <a:buFont typeface="Arial"/>
+              <a:buNone/>
+            </a:pPr>
+            <a:r>
+              <a:rPr lang="en-US" sz="3200">
+                <a:solidFill>
+                  <a:schemeClr val="dk1"/>
+                </a:solidFill>
+              </a:rPr>
+              <a:t>○ used for nightly builds</a:t>
+            </a:r>
+            <a:endParaRPr sz="3200">
+              <a:solidFill>
+                <a:schemeClr val="dk1"/>
+              </a:solidFill>
+            </a:endParaRPr>
+          </a:p>
+          <a:p>
+            <a:pPr indent="457200" lvl="0" marL="457200" rtl="0">
+              <a:spcBef>
+                <a:spcPts val="0"/>
+              </a:spcBef>
+              <a:spcAft>
+                <a:spcPts val="0"/>
+              </a:spcAft>
+              <a:buClr>
+                <a:srgbClr val="000000"/>
+              </a:buClr>
+              <a:buSzPts val="1100"/>
+              <a:buFont typeface="Arial"/>
+              <a:buNone/>
+            </a:pPr>
+            <a:r>
+              <a:rPr lang="en-US" sz="3200">
+                <a:solidFill>
+                  <a:schemeClr val="dk1"/>
+                </a:solidFill>
+              </a:rPr>
+              <a:t>○ getting a production </a:t>
+            </a:r>
+            <a:br>
+              <a:rPr lang="en-US" sz="3200">
+                <a:solidFill>
+                  <a:schemeClr val="dk1"/>
+                </a:solidFill>
+              </a:rPr>
+            </a:br>
+            <a:r>
+              <a:rPr lang="en-US" sz="3200">
+                <a:solidFill>
+                  <a:schemeClr val="dk1"/>
+                </a:solidFill>
+              </a:rPr>
+              <a:t>release when merging with </a:t>
+            </a:r>
+            <a:br>
+              <a:rPr lang="en-US" sz="3200">
+                <a:solidFill>
+                  <a:schemeClr val="dk1"/>
+                </a:solidFill>
+              </a:rPr>
+            </a:br>
+            <a:r>
+              <a:rPr lang="en-US" sz="3200">
+                <a:solidFill>
+                  <a:schemeClr val="dk1"/>
+                </a:solidFill>
+              </a:rPr>
+              <a:t>master</a:t>
+            </a:r>
+            <a:endParaRPr sz="3200">
+              <a:solidFill>
+                <a:schemeClr val="dk1"/>
+              </a:solidFill>
+            </a:endParaRPr>
+          </a:p>
+          <a:p>
+            <a:pPr indent="457200" lvl="0" marL="457200" rtl="0">
+              <a:spcBef>
+                <a:spcPts val="0"/>
+              </a:spcBef>
+              <a:spcAft>
+                <a:spcPts val="0"/>
+              </a:spcAft>
+              <a:buNone/>
+            </a:pPr>
+            <a:r>
+              <a:t/>
+            </a:r>
+            <a:endParaRPr sz="3000"/>
+          </a:p>
+        </p:txBody>
+      </p:sp>
+    </p:spTree>
+  </p:cSld>
+  <p:clrMapOvr>
+    <a:masterClrMapping/>
+  </p:clrMapOvr>
+</p:sld>
+</file>
+
+<file path=ppt/slides/slide25.xml><?xml version="1.0" encoding="utf-8"?>
+<p:sld xmlns:a="http://schemas.openxmlformats.org/drawingml/2006/main" xmlns:r="http://schemas.openxmlformats.org/officeDocument/2006/relationships" xmlns:mc="http://schemas.openxmlformats.org/markup-compatibility/2006" xmlns:mv="urn:schemas-microsoft-com:mac:vml" xmlns:p="http://schemas.openxmlformats.org/presentationml/2006/main" xmlns:c="http://schemas.openxmlformats.org/drawingml/2006/chart" xmlns:dgm="http://schemas.openxmlformats.org/drawingml/2006/diagram" xmlns:o="urn:schemas-microsoft-com:office:office" xmlns:v="urn:schemas-microsoft-com:vml" xmlns:pvml="urn:schemas-microsoft-com:office:powerpoint" xmlns:com="http://schemas.openxmlformats.org/drawingml/2006/compatibility" xmlns:p14="http://schemas.microsoft.com/office/powerpoint/2010/main" xmlns:p15="http://schemas.microsoft.com/office/powerpoint/2012/main">
+  <p:cSld>
+    <p:spTree>
+      <p:nvGrpSpPr>
+        <p:cNvPr id="290" name="Shape 290"/>
+        <p:cNvGrpSpPr/>
+        <p:nvPr/>
+      </p:nvGrpSpPr>
+      <p:grpSpPr>
+        <a:xfrm>
+          <a:off x="0" y="0"/>
+          <a:ext cx="0" cy="0"/>
+          <a:chOff x="0" y="0"/>
+          <a:chExt cx="0" cy="0"/>
+        </a:xfrm>
+      </p:grpSpPr>
+      <p:pic>
+        <p:nvPicPr>
+          <p:cNvPr id="291" name="Shape 291"/>
+          <p:cNvPicPr preferRelativeResize="0"/>
+          <p:nvPr/>
+        </p:nvPicPr>
+        <p:blipFill>
+          <a:blip r:embed="rId3">
+            <a:alphaModFix/>
+          </a:blip>
+          <a:stretch>
+            <a:fillRect/>
+          </a:stretch>
+        </p:blipFill>
+        <p:spPr>
+          <a:xfrm>
+            <a:off x="5486400" y="1365875"/>
+            <a:ext cx="3657600" cy="4953000"/>
+          </a:xfrm>
+          <a:prstGeom prst="rect">
+            <a:avLst/>
+          </a:prstGeom>
+          <a:noFill/>
+          <a:ln>
+            <a:noFill/>
+          </a:ln>
+        </p:spPr>
+      </p:pic>
+      <p:sp>
+        <p:nvSpPr>
+          <p:cNvPr id="292" name="Shape 292"/>
+          <p:cNvSpPr txBox="1"/>
+          <p:nvPr/>
+        </p:nvSpPr>
+        <p:spPr>
+          <a:xfrm>
+            <a:off x="0" y="0"/>
+            <a:ext cx="9144000" cy="708000"/>
+          </a:xfrm>
+          <a:prstGeom prst="rect">
+            <a:avLst/>
+          </a:prstGeom>
+          <a:noFill/>
+          <a:ln>
+            <a:noFill/>
+          </a:ln>
+        </p:spPr>
+        <p:txBody>
+          <a:bodyPr anchorCtr="0" anchor="t" bIns="45700" lIns="91425" spcFirstLastPara="1" rIns="91425" wrap="square" tIns="45700">
+            <a:noAutofit/>
+          </a:bodyPr>
+          <a:lstStyle/>
+          <a:p>
+            <a:pPr indent="0" lvl="0" marL="0" marR="0" rtl="0" algn="l">
+              <a:spcBef>
+                <a:spcPts val="0"/>
+              </a:spcBef>
+              <a:spcAft>
+                <a:spcPts val="0"/>
+              </a:spcAft>
+              <a:buNone/>
+            </a:pPr>
+            <a:r>
+              <a:rPr lang="en-US" sz="4000" u="sng">
+                <a:solidFill>
+                  <a:schemeClr val="dk2"/>
+                </a:solidFill>
+              </a:rPr>
+              <a:t>Feature branches (topic branches)</a:t>
+            </a:r>
+            <a:endParaRPr sz="4000" u="sng">
+              <a:solidFill>
+                <a:schemeClr val="dk2"/>
+              </a:solidFill>
+            </a:endParaRPr>
+          </a:p>
+          <a:p>
+            <a:pPr indent="0" lvl="0" marL="0" marR="0" rtl="0" algn="l">
+              <a:spcBef>
+                <a:spcPts val="0"/>
+              </a:spcBef>
+              <a:spcAft>
+                <a:spcPts val="0"/>
+              </a:spcAft>
+              <a:buNone/>
+            </a:pPr>
+            <a:r>
+              <a:t/>
+            </a:r>
+            <a:endParaRPr sz="4000" u="sng">
+              <a:solidFill>
+                <a:schemeClr val="dk2"/>
+              </a:solidFill>
+            </a:endParaRPr>
+          </a:p>
+        </p:txBody>
+      </p:sp>
+      <p:sp>
+        <p:nvSpPr>
+          <p:cNvPr id="293" name="Shape 293"/>
+          <p:cNvSpPr txBox="1"/>
+          <p:nvPr/>
+        </p:nvSpPr>
+        <p:spPr>
+          <a:xfrm>
+            <a:off x="0" y="1365875"/>
+            <a:ext cx="7459800" cy="5358300"/>
+          </a:xfrm>
+          <a:prstGeom prst="rect">
+            <a:avLst/>
+          </a:prstGeom>
+          <a:noFill/>
+          <a:ln>
+            <a:noFill/>
+          </a:ln>
+        </p:spPr>
+        <p:txBody>
+          <a:bodyPr anchorCtr="0" anchor="t" bIns="91425" lIns="91425" spcFirstLastPara="1" rIns="91425" wrap="square" tIns="91425">
+            <a:noAutofit/>
+          </a:bodyPr>
+          <a:lstStyle/>
+          <a:p>
+            <a:pPr indent="-419100" lvl="0" marL="457200" rtl="0">
+              <a:spcBef>
+                <a:spcPts val="0"/>
+              </a:spcBef>
+              <a:spcAft>
+                <a:spcPts val="0"/>
+              </a:spcAft>
+              <a:buSzPts val="3000"/>
+              <a:buChar char="●"/>
+            </a:pPr>
+            <a:r>
+              <a:rPr lang="en-US" sz="3000"/>
+              <a:t>May branch off from:</a:t>
+            </a:r>
+            <a:endParaRPr sz="3000"/>
+          </a:p>
+          <a:p>
+            <a:pPr indent="457200" lvl="0" marL="0" rtl="0">
+              <a:spcBef>
+                <a:spcPts val="0"/>
+              </a:spcBef>
+              <a:spcAft>
+                <a:spcPts val="0"/>
+              </a:spcAft>
+              <a:buNone/>
+            </a:pPr>
+            <a:r>
+              <a:rPr lang="en-US" sz="3000"/>
+              <a:t>○ develop</a:t>
+            </a:r>
+            <a:endParaRPr sz="3000"/>
+          </a:p>
+          <a:p>
+            <a:pPr indent="0" lvl="0" marL="0" rtl="0">
+              <a:spcBef>
+                <a:spcPts val="0"/>
+              </a:spcBef>
+              <a:spcAft>
+                <a:spcPts val="0"/>
+              </a:spcAft>
+              <a:buNone/>
+            </a:pPr>
+            <a:r>
+              <a:rPr lang="en-US" sz="3000"/>
+              <a:t>● May merge back into:</a:t>
+            </a:r>
+            <a:endParaRPr sz="3000"/>
+          </a:p>
+          <a:p>
+            <a:pPr indent="457200" lvl="0" marL="0" rtl="0">
+              <a:spcBef>
+                <a:spcPts val="0"/>
+              </a:spcBef>
+              <a:spcAft>
+                <a:spcPts val="0"/>
+              </a:spcAft>
+              <a:buNone/>
+            </a:pPr>
+            <a:r>
+              <a:rPr lang="en-US" sz="3000"/>
+              <a:t>○ develop</a:t>
+            </a:r>
+            <a:endParaRPr sz="3000"/>
+          </a:p>
+          <a:p>
+            <a:pPr indent="0" lvl="0" marL="0" rtl="0">
+              <a:spcBef>
+                <a:spcPts val="0"/>
+              </a:spcBef>
+              <a:spcAft>
+                <a:spcPts val="0"/>
+              </a:spcAft>
+              <a:buNone/>
+            </a:pPr>
+            <a:r>
+              <a:rPr lang="en-US" sz="3000"/>
+              <a:t>● Branching name convention:</a:t>
+            </a:r>
+            <a:endParaRPr sz="3000"/>
+          </a:p>
+          <a:p>
+            <a:pPr indent="457200" lvl="0" marL="0">
+              <a:spcBef>
+                <a:spcPts val="0"/>
+              </a:spcBef>
+              <a:spcAft>
+                <a:spcPts val="0"/>
+              </a:spcAft>
+              <a:buNone/>
+            </a:pPr>
+            <a:r>
+              <a:rPr lang="en-US" sz="3000"/>
+              <a:t>○ anything except master, </a:t>
+            </a:r>
+            <a:endParaRPr sz="3000"/>
+          </a:p>
+          <a:p>
+            <a:pPr indent="457200" lvl="0" marL="457200" rtl="0">
+              <a:spcBef>
+                <a:spcPts val="0"/>
+              </a:spcBef>
+              <a:spcAft>
+                <a:spcPts val="0"/>
+              </a:spcAft>
+              <a:buNone/>
+            </a:pPr>
+            <a:r>
+              <a:rPr lang="en-US" sz="3000"/>
+              <a:t>develop,release-* or hotfix-*</a:t>
+            </a:r>
+            <a:endParaRPr sz="3000"/>
+          </a:p>
+        </p:txBody>
+      </p:sp>
+    </p:spTree>
+  </p:cSld>
+  <p:clrMapOvr>
+    <a:masterClrMapping/>
+  </p:clrMapOvr>
+</p:sld>
+</file>
+
+<file path=ppt/slides/slide26.xml><?xml version="1.0" encoding="utf-8"?>
+<p:sld xmlns:a="http://schemas.openxmlformats.org/drawingml/2006/main" xmlns:r="http://schemas.openxmlformats.org/officeDocument/2006/relationships" xmlns:mc="http://schemas.openxmlformats.org/markup-compatibility/2006" xmlns:mv="urn:schemas-microsoft-com:mac:vml" xmlns:p="http://schemas.openxmlformats.org/presentationml/2006/main" xmlns:c="http://schemas.openxmlformats.org/drawingml/2006/chart" xmlns:dgm="http://schemas.openxmlformats.org/drawingml/2006/diagram" xmlns:o="urn:schemas-microsoft-com:office:office" xmlns:v="urn:schemas-microsoft-com:vml" xmlns:pvml="urn:schemas-microsoft-com:office:powerpoint" xmlns:com="http://schemas.openxmlformats.org/drawingml/2006/compatibility" xmlns:p14="http://schemas.microsoft.com/office/powerpoint/2010/main" xmlns:p15="http://schemas.microsoft.com/office/powerpoint/2012/main">
+  <p:cSld>
+    <p:spTree>
+      <p:nvGrpSpPr>
+        <p:cNvPr id="297" name="Shape 297"/>
+        <p:cNvGrpSpPr/>
+        <p:nvPr/>
+      </p:nvGrpSpPr>
+      <p:grpSpPr>
+        <a:xfrm>
+          <a:off x="0" y="0"/>
+          <a:ext cx="0" cy="0"/>
+          <a:chOff x="0" y="0"/>
+          <a:chExt cx="0" cy="0"/>
+        </a:xfrm>
+      </p:grpSpPr>
+      <p:sp>
+        <p:nvSpPr>
+          <p:cNvPr id="298" name="Shape 298"/>
           <p:cNvSpPr txBox="1"/>
           <p:nvPr>
             <p:ph type="title"/>
@@ -22288,7 +23644,7 @@
       </p:sp>
       <p:sp>
         <p:nvSpPr>
-          <p:cNvPr id="275" name="Shape 275"/>
+          <p:cNvPr id="299" name="Shape 299"/>
           <p:cNvSpPr txBox="1"/>
           <p:nvPr>
             <p:ph idx="1" type="body"/>
@@ -22492,12 +23848,12 @@
 </p:sld>
 </file>
 
-<file path=ppt/slides/slide24.xml><?xml version="1.0" encoding="utf-8"?>
+<file path=ppt/slides/slide27.xml><?xml version="1.0" encoding="utf-8"?>
 <p:sld xmlns:a="http://schemas.openxmlformats.org/drawingml/2006/main" xmlns:r="http://schemas.openxmlformats.org/officeDocument/2006/relationships" xmlns:mc="http://schemas.openxmlformats.org/markup-compatibility/2006" xmlns:mv="urn:schemas-microsoft-com:mac:vml" xmlns:p="http://schemas.openxmlformats.org/presentationml/2006/main" xmlns:c="http://schemas.openxmlformats.org/drawingml/2006/chart" xmlns:dgm="http://schemas.openxmlformats.org/drawingml/2006/diagram" xmlns:o="urn:schemas-microsoft-com:office:office" xmlns:v="urn:schemas-microsoft-com:vml" xmlns:pvml="urn:schemas-microsoft-com:office:powerpoint" xmlns:com="http://schemas.openxmlformats.org/drawingml/2006/compatibility" xmlns:p14="http://schemas.microsoft.com/office/powerpoint/2010/main" xmlns:p15="http://schemas.microsoft.com/office/powerpoint/2012/main">
   <p:cSld>
     <p:spTree>
       <p:nvGrpSpPr>
-        <p:cNvPr id="280" name="Shape 280"/>
+        <p:cNvPr id="304" name="Shape 304"/>
         <p:cNvGrpSpPr/>
         <p:nvPr/>
       </p:nvGrpSpPr>
@@ -22511,7 +23867,7 @@
       </p:grpSpPr>
       <p:sp>
         <p:nvSpPr>
-          <p:cNvPr id="281" name="Shape 281"/>
+          <p:cNvPr id="305" name="Shape 305"/>
           <p:cNvSpPr txBox="1"/>
           <p:nvPr>
             <p:ph type="title"/>
@@ -22567,7 +23923,7 @@
       </p:sp>
       <p:sp>
         <p:nvSpPr>
-          <p:cNvPr id="282" name="Shape 282"/>
+          <p:cNvPr id="306" name="Shape 306"/>
           <p:cNvSpPr txBox="1"/>
           <p:nvPr>
             <p:ph idx="1" type="body"/>
@@ -22870,12 +24226,12 @@
 </p:sld>
 </file>
 
-<file path=ppt/slides/slide25.xml><?xml version="1.0" encoding="utf-8"?>
+<file path=ppt/slides/slide28.xml><?xml version="1.0" encoding="utf-8"?>
 <p:sld xmlns:a="http://schemas.openxmlformats.org/drawingml/2006/main" xmlns:r="http://schemas.openxmlformats.org/officeDocument/2006/relationships" xmlns:mc="http://schemas.openxmlformats.org/markup-compatibility/2006" xmlns:mv="urn:schemas-microsoft-com:mac:vml" xmlns:p="http://schemas.openxmlformats.org/presentationml/2006/main" xmlns:c="http://schemas.openxmlformats.org/drawingml/2006/chart" xmlns:dgm="http://schemas.openxmlformats.org/drawingml/2006/diagram" xmlns:o="urn:schemas-microsoft-com:office:office" xmlns:v="urn:schemas-microsoft-com:vml" xmlns:pvml="urn:schemas-microsoft-com:office:powerpoint" xmlns:com="http://schemas.openxmlformats.org/drawingml/2006/compatibility" xmlns:p14="http://schemas.microsoft.com/office/powerpoint/2010/main" xmlns:p15="http://schemas.microsoft.com/office/powerpoint/2012/main">
   <p:cSld>
     <p:spTree>
       <p:nvGrpSpPr>
-        <p:cNvPr id="287" name="Shape 287"/>
+        <p:cNvPr id="311" name="Shape 311"/>
         <p:cNvGrpSpPr/>
         <p:nvPr/>
       </p:nvGrpSpPr>
@@ -22889,7 +24245,7 @@
       </p:grpSpPr>
       <p:sp>
         <p:nvSpPr>
-          <p:cNvPr id="288" name="Shape 288"/>
+          <p:cNvPr id="312" name="Shape 312"/>
           <p:cNvSpPr txBox="1"/>
           <p:nvPr>
             <p:ph type="title"/>
@@ -22945,7 +24301,7 @@
       </p:sp>
       <p:sp>
         <p:nvSpPr>
-          <p:cNvPr id="289" name="Shape 289"/>
+          <p:cNvPr id="313" name="Shape 313"/>
           <p:cNvSpPr txBox="1"/>
           <p:nvPr>
             <p:ph idx="1" type="body"/>
@@ -23068,12 +24424,12 @@
 </p:sld>
 </file>
 
-<file path=ppt/slides/slide26.xml><?xml version="1.0" encoding="utf-8"?>
+<file path=ppt/slides/slide29.xml><?xml version="1.0" encoding="utf-8"?>
 <p:sld xmlns:a="http://schemas.openxmlformats.org/drawingml/2006/main" xmlns:r="http://schemas.openxmlformats.org/officeDocument/2006/relationships" xmlns:mc="http://schemas.openxmlformats.org/markup-compatibility/2006" xmlns:mv="urn:schemas-microsoft-com:mac:vml" xmlns:p="http://schemas.openxmlformats.org/presentationml/2006/main" xmlns:c="http://schemas.openxmlformats.org/drawingml/2006/chart" xmlns:dgm="http://schemas.openxmlformats.org/drawingml/2006/diagram" xmlns:o="urn:schemas-microsoft-com:office:office" xmlns:v="urn:schemas-microsoft-com:vml" xmlns:pvml="urn:schemas-microsoft-com:office:powerpoint" xmlns:com="http://schemas.openxmlformats.org/drawingml/2006/compatibility" xmlns:p14="http://schemas.microsoft.com/office/powerpoint/2010/main" xmlns:p15="http://schemas.microsoft.com/office/powerpoint/2012/main">
   <p:cSld>
     <p:spTree>
       <p:nvGrpSpPr>
-        <p:cNvPr id="294" name="Shape 294"/>
+        <p:cNvPr id="318" name="Shape 318"/>
         <p:cNvGrpSpPr/>
         <p:nvPr/>
       </p:nvGrpSpPr>
@@ -23087,7 +24443,7 @@
       </p:grpSpPr>
       <p:sp>
         <p:nvSpPr>
-          <p:cNvPr id="295" name="Shape 295"/>
+          <p:cNvPr id="319" name="Shape 319"/>
           <p:cNvSpPr txBox="1"/>
           <p:nvPr>
             <p:ph type="title"/>
@@ -23155,7 +24511,7 @@
       </p:sp>
       <p:sp>
         <p:nvSpPr>
-          <p:cNvPr id="296" name="Shape 296"/>
+          <p:cNvPr id="320" name="Shape 320"/>
           <p:cNvSpPr txBox="1"/>
           <p:nvPr>
             <p:ph idx="1" type="body"/>
@@ -23231,9 +24587,21 @@
             </a:pPr>
             <a:r>
               <a:rPr lang="en-US" sz="2400"/>
-              <a:t>create branch called &lt;your name&gt;</a:t>
+              <a:t>create branch called &lt;your name&gt; </a:t>
             </a:r>
-            <a:endParaRPr sz="2400"/>
+            <a:r>
+              <a:rPr b="1" lang="en-US" sz="2400" u="sng">
+                <a:solidFill>
+                  <a:srgbClr val="4A86E8"/>
+                </a:solidFill>
+              </a:rPr>
+              <a:t>and switch</a:t>
+            </a:r>
+            <a:endParaRPr b="1" sz="2400" u="sng">
+              <a:solidFill>
+                <a:srgbClr val="4A86E8"/>
+              </a:solidFill>
+            </a:endParaRPr>
           </a:p>
           <a:p>
             <a:pPr indent="-381000" lvl="0" marL="457200" rtl="0">
@@ -23362,7 +24730,7 @@
       </p:sp>
       <p:pic>
         <p:nvPicPr>
-          <p:cNvPr id="297" name="Shape 297"/>
+          <p:cNvPr id="321" name="Shape 321"/>
           <p:cNvPicPr preferRelativeResize="0"/>
           <p:nvPr/>
         </p:nvPicPr>
@@ -23394,79 +24762,6 @@
           </a:ln>
         </p:spPr>
       </p:pic>
-    </p:spTree>
-  </p:cSld>
-  <p:clrMapOvr>
-    <a:masterClrMapping/>
-  </p:clrMapOvr>
-</p:sld>
-</file>
-
-<file path=ppt/slides/slide27.xml><?xml version="1.0" encoding="utf-8"?>
-<p:sld xmlns:a="http://schemas.openxmlformats.org/drawingml/2006/main" xmlns:r="http://schemas.openxmlformats.org/officeDocument/2006/relationships" xmlns:mc="http://schemas.openxmlformats.org/markup-compatibility/2006" xmlns:mv="urn:schemas-microsoft-com:mac:vml" xmlns:p="http://schemas.openxmlformats.org/presentationml/2006/main" xmlns:c="http://schemas.openxmlformats.org/drawingml/2006/chart" xmlns:dgm="http://schemas.openxmlformats.org/drawingml/2006/diagram" xmlns:o="urn:schemas-microsoft-com:office:office" xmlns:v="urn:schemas-microsoft-com:vml" xmlns:pvml="urn:schemas-microsoft-com:office:powerpoint" xmlns:com="http://schemas.openxmlformats.org/drawingml/2006/compatibility" xmlns:p14="http://schemas.microsoft.com/office/powerpoint/2010/main" xmlns:p15="http://schemas.microsoft.com/office/powerpoint/2012/main">
-  <p:cSld>
-    <p:spTree>
-      <p:nvGrpSpPr>
-        <p:cNvPr id="302" name="Shape 302"/>
-        <p:cNvGrpSpPr/>
-        <p:nvPr/>
-      </p:nvGrpSpPr>
-      <p:grpSpPr>
-        <a:xfrm>
-          <a:off x="0" y="0"/>
-          <a:ext cx="0" cy="0"/>
-          <a:chOff x="0" y="0"/>
-          <a:chExt cx="0" cy="0"/>
-        </a:xfrm>
-      </p:grpSpPr>
-      <p:sp>
-        <p:nvSpPr>
-          <p:cNvPr id="303" name="Shape 303"/>
-          <p:cNvSpPr txBox="1"/>
-          <p:nvPr>
-            <p:ph type="title"/>
-          </p:nvPr>
-        </p:nvSpPr>
-        <p:spPr>
-          <a:xfrm>
-            <a:off x="0" y="0"/>
-            <a:ext cx="9144000" cy="6858000"/>
-          </a:xfrm>
-          <a:prstGeom prst="rect">
-            <a:avLst/>
-          </a:prstGeom>
-        </p:spPr>
-        <p:txBody>
-          <a:bodyPr anchorCtr="0" anchor="ctr" bIns="45700" lIns="91425" spcFirstLastPara="1" rIns="91425" wrap="square" tIns="45700">
-            <a:noAutofit/>
-          </a:bodyPr>
-          <a:lstStyle/>
-          <a:p>
-            <a:pPr indent="0" lvl="0" marL="0" algn="ctr">
-              <a:spcBef>
-                <a:spcPts val="0"/>
-              </a:spcBef>
-              <a:spcAft>
-                <a:spcPts val="0"/>
-              </a:spcAft>
-              <a:buNone/>
-            </a:pPr>
-            <a:r>
-              <a:rPr lang="en-US" u="sng">
-                <a:solidFill>
-                  <a:schemeClr val="dk2"/>
-                </a:solidFill>
-              </a:rPr>
-              <a:t>Q &amp; a</a:t>
-            </a:r>
-            <a:endParaRPr u="sng">
-              <a:solidFill>
-                <a:schemeClr val="dk2"/>
-              </a:solidFill>
-            </a:endParaRPr>
-          </a:p>
-        </p:txBody>
-      </p:sp>
     </p:spTree>
   </p:cSld>
   <p:clrMapOvr>
@@ -23782,6 +25077,79 @@
               <a:ea typeface="Arial"/>
               <a:cs typeface="Arial"/>
               <a:sym typeface="Arial"/>
+            </a:endParaRPr>
+          </a:p>
+        </p:txBody>
+      </p:sp>
+    </p:spTree>
+  </p:cSld>
+  <p:clrMapOvr>
+    <a:masterClrMapping/>
+  </p:clrMapOvr>
+</p:sld>
+</file>
+
+<file path=ppt/slides/slide30.xml><?xml version="1.0" encoding="utf-8"?>
+<p:sld xmlns:a="http://schemas.openxmlformats.org/drawingml/2006/main" xmlns:r="http://schemas.openxmlformats.org/officeDocument/2006/relationships" xmlns:mc="http://schemas.openxmlformats.org/markup-compatibility/2006" xmlns:mv="urn:schemas-microsoft-com:mac:vml" xmlns:p="http://schemas.openxmlformats.org/presentationml/2006/main" xmlns:c="http://schemas.openxmlformats.org/drawingml/2006/chart" xmlns:dgm="http://schemas.openxmlformats.org/drawingml/2006/diagram" xmlns:o="urn:schemas-microsoft-com:office:office" xmlns:v="urn:schemas-microsoft-com:vml" xmlns:pvml="urn:schemas-microsoft-com:office:powerpoint" xmlns:com="http://schemas.openxmlformats.org/drawingml/2006/compatibility" xmlns:p14="http://schemas.microsoft.com/office/powerpoint/2010/main" xmlns:p15="http://schemas.microsoft.com/office/powerpoint/2012/main">
+  <p:cSld>
+    <p:spTree>
+      <p:nvGrpSpPr>
+        <p:cNvPr id="326" name="Shape 326"/>
+        <p:cNvGrpSpPr/>
+        <p:nvPr/>
+      </p:nvGrpSpPr>
+      <p:grpSpPr>
+        <a:xfrm>
+          <a:off x="0" y="0"/>
+          <a:ext cx="0" cy="0"/>
+          <a:chOff x="0" y="0"/>
+          <a:chExt cx="0" cy="0"/>
+        </a:xfrm>
+      </p:grpSpPr>
+      <p:sp>
+        <p:nvSpPr>
+          <p:cNvPr id="327" name="Shape 327"/>
+          <p:cNvSpPr txBox="1"/>
+          <p:nvPr>
+            <p:ph type="title"/>
+          </p:nvPr>
+        </p:nvSpPr>
+        <p:spPr>
+          <a:xfrm>
+            <a:off x="0" y="0"/>
+            <a:ext cx="9144000" cy="6858000"/>
+          </a:xfrm>
+          <a:prstGeom prst="rect">
+            <a:avLst/>
+          </a:prstGeom>
+        </p:spPr>
+        <p:txBody>
+          <a:bodyPr anchorCtr="0" anchor="ctr" bIns="45700" lIns="91425" spcFirstLastPara="1" rIns="91425" wrap="square" tIns="45700">
+            <a:noAutofit/>
+          </a:bodyPr>
+          <a:lstStyle/>
+          <a:p>
+            <a:pPr indent="0" lvl="0" marL="0" algn="ctr">
+              <a:spcBef>
+                <a:spcPts val="0"/>
+              </a:spcBef>
+              <a:spcAft>
+                <a:spcPts val="0"/>
+              </a:spcAft>
+              <a:buNone/>
+            </a:pPr>
+            <a:r>
+              <a:rPr lang="en-US" u="sng">
+                <a:solidFill>
+                  <a:schemeClr val="dk2"/>
+                </a:solidFill>
+              </a:rPr>
+              <a:t>Q &amp; a</a:t>
+            </a:r>
+            <a:endParaRPr u="sng">
+              <a:solidFill>
+                <a:schemeClr val="dk2"/>
+              </a:solidFill>
             </a:endParaRPr>
           </a:p>
         </p:txBody>

</xml_diff>